<commit_message>
Añadidos bordes del BodyBasic
</commit_message>
<xml_diff>
--- a/Presentación Práctica 1.pptx
+++ b/Presentación Práctica 1.pptx
@@ -641,7 +641,7 @@
               <a:rPr lang="es-ES" smtClean="0"/>
               <a:t>26/10/aa</a:t>
             </a:fld>
-            <a:endParaRPr lang="es-ES"/>
+            <a:endParaRPr lang="es-ES" dirty="0"/>
           </a:p>
         </p:txBody>
       </p:sp>
@@ -665,7 +665,7 @@
           <a:bodyPr/>
           <a:lstStyle/>
           <a:p>
-            <a:endParaRPr lang="es-ES"/>
+            <a:endParaRPr lang="es-ES" dirty="0"/>
           </a:p>
         </p:txBody>
       </p:sp>
@@ -693,7 +693,7 @@
               <a:rPr lang="es-ES" smtClean="0"/>
               <a:t>‹Nº›</a:t>
             </a:fld>
-            <a:endParaRPr lang="es-ES"/>
+            <a:endParaRPr lang="es-ES" dirty="0"/>
           </a:p>
         </p:txBody>
       </p:sp>
@@ -740,7 +740,7 @@
           </a:ln>
           <a:extLst>
             <a:ext uri="{91240B29-F687-4f45-9708-019B960494DF}">
-              <a14:hiddenLine xmlns="" xmlns:a14="http://schemas.microsoft.com/office/drawing/2010/main" w="9525">
+              <a14:hiddenLine xmlns:a14="http://schemas.microsoft.com/office/drawing/2010/main" xmlns="" w="9525">
                 <a:solidFill>
                   <a:srgbClr val="000000"/>
                 </a:solidFill>
@@ -795,7 +795,7 @@
           </a:ln>
           <a:extLst>
             <a:ext uri="{91240B29-F687-4f45-9708-019B960494DF}">
-              <a14:hiddenLine xmlns="" xmlns:a14="http://schemas.microsoft.com/office/drawing/2010/main" w="9525">
+              <a14:hiddenLine xmlns:a14="http://schemas.microsoft.com/office/drawing/2010/main" xmlns="" w="9525">
                 <a:solidFill>
                   <a:srgbClr val="000000"/>
                 </a:solidFill>
@@ -959,7 +959,7 @@
           </a:lstStyle>
           <a:p>
             <a:r>
-              <a:rPr lang="es-ES" smtClean="0"/>
+              <a:rPr lang="es-ES" dirty="0" smtClean="0"/>
               <a:t>Haga clic en el icono para agregar una imagen</a:t>
             </a:r>
             <a:endParaRPr lang="en-US" dirty="0"/>
@@ -1052,7 +1052,7 @@
               <a:rPr lang="es-ES" smtClean="0"/>
               <a:t>26/10/aa</a:t>
             </a:fld>
-            <a:endParaRPr lang="es-ES"/>
+            <a:endParaRPr lang="es-ES" dirty="0"/>
           </a:p>
         </p:txBody>
       </p:sp>
@@ -1071,7 +1071,7 @@
           <a:bodyPr/>
           <a:lstStyle/>
           <a:p>
-            <a:endParaRPr lang="es-ES"/>
+            <a:endParaRPr lang="es-ES" dirty="0"/>
           </a:p>
         </p:txBody>
       </p:sp>
@@ -1094,7 +1094,7 @@
               <a:rPr lang="es-ES" smtClean="0"/>
               <a:t>‹Nº›</a:t>
             </a:fld>
-            <a:endParaRPr lang="es-ES"/>
+            <a:endParaRPr lang="es-ES" dirty="0"/>
           </a:p>
         </p:txBody>
       </p:sp>
@@ -1300,7 +1300,7 @@
               <a:rPr lang="es-ES" smtClean="0"/>
               <a:t>26/10/aa</a:t>
             </a:fld>
-            <a:endParaRPr lang="es-ES"/>
+            <a:endParaRPr lang="es-ES" dirty="0"/>
           </a:p>
         </p:txBody>
       </p:sp>
@@ -1319,7 +1319,7 @@
           <a:bodyPr/>
           <a:lstStyle/>
           <a:p>
-            <a:endParaRPr lang="es-ES"/>
+            <a:endParaRPr lang="es-ES" dirty="0"/>
           </a:p>
         </p:txBody>
       </p:sp>
@@ -1342,7 +1342,7 @@
               <a:rPr lang="es-ES" smtClean="0"/>
               <a:t>‹Nº›</a:t>
             </a:fld>
-            <a:endParaRPr lang="es-ES"/>
+            <a:endParaRPr lang="es-ES" dirty="0"/>
           </a:p>
         </p:txBody>
       </p:sp>
@@ -1840,7 +1840,7 @@
               <a:rPr lang="es-ES" smtClean="0"/>
               <a:t>26/10/aa</a:t>
             </a:fld>
-            <a:endParaRPr lang="es-ES"/>
+            <a:endParaRPr lang="es-ES" dirty="0"/>
           </a:p>
         </p:txBody>
       </p:sp>
@@ -1859,7 +1859,7 @@
           <a:bodyPr/>
           <a:lstStyle/>
           <a:p>
-            <a:endParaRPr lang="es-ES"/>
+            <a:endParaRPr lang="es-ES" dirty="0"/>
           </a:p>
         </p:txBody>
       </p:sp>
@@ -1882,7 +1882,7 @@
               <a:rPr lang="es-ES" smtClean="0"/>
               <a:t>‹Nº›</a:t>
             </a:fld>
-            <a:endParaRPr lang="es-ES"/>
+            <a:endParaRPr lang="es-ES" dirty="0"/>
           </a:p>
         </p:txBody>
       </p:sp>
@@ -2088,7 +2088,7 @@
               <a:rPr lang="es-ES" smtClean="0"/>
               <a:t>26/10/aa</a:t>
             </a:fld>
-            <a:endParaRPr lang="es-ES"/>
+            <a:endParaRPr lang="es-ES" dirty="0"/>
           </a:p>
         </p:txBody>
       </p:sp>
@@ -2107,7 +2107,7 @@
           <a:bodyPr/>
           <a:lstStyle/>
           <a:p>
-            <a:endParaRPr lang="es-ES"/>
+            <a:endParaRPr lang="es-ES" dirty="0"/>
           </a:p>
         </p:txBody>
       </p:sp>
@@ -2130,7 +2130,7 @@
               <a:rPr lang="es-ES" smtClean="0"/>
               <a:t>‹Nº›</a:t>
             </a:fld>
-            <a:endParaRPr lang="es-ES"/>
+            <a:endParaRPr lang="es-ES" dirty="0"/>
           </a:p>
         </p:txBody>
       </p:sp>
@@ -2620,7 +2620,7 @@
               <a:rPr lang="es-ES" smtClean="0"/>
               <a:t>26/10/aa</a:t>
             </a:fld>
-            <a:endParaRPr lang="es-ES"/>
+            <a:endParaRPr lang="es-ES" dirty="0"/>
           </a:p>
         </p:txBody>
       </p:sp>
@@ -2639,7 +2639,7 @@
           <a:bodyPr/>
           <a:lstStyle/>
           <a:p>
-            <a:endParaRPr lang="es-ES"/>
+            <a:endParaRPr lang="es-ES" dirty="0"/>
           </a:p>
         </p:txBody>
       </p:sp>
@@ -2662,7 +2662,7 @@
               <a:rPr lang="es-ES" smtClean="0"/>
               <a:t>‹Nº›</a:t>
             </a:fld>
-            <a:endParaRPr lang="es-ES"/>
+            <a:endParaRPr lang="es-ES" dirty="0"/>
           </a:p>
         </p:txBody>
       </p:sp>
@@ -2917,7 +2917,7 @@
               <a:rPr lang="es-ES" smtClean="0"/>
               <a:t>26/10/aa</a:t>
             </a:fld>
-            <a:endParaRPr lang="es-ES"/>
+            <a:endParaRPr lang="es-ES" dirty="0"/>
           </a:p>
         </p:txBody>
       </p:sp>
@@ -2936,7 +2936,7 @@
           <a:bodyPr/>
           <a:lstStyle/>
           <a:p>
-            <a:endParaRPr lang="es-ES"/>
+            <a:endParaRPr lang="es-ES" dirty="0"/>
           </a:p>
         </p:txBody>
       </p:sp>
@@ -2959,7 +2959,7 @@
               <a:rPr lang="es-ES" smtClean="0"/>
               <a:t>‹Nº›</a:t>
             </a:fld>
-            <a:endParaRPr lang="es-ES"/>
+            <a:endParaRPr lang="es-ES" dirty="0"/>
           </a:p>
         </p:txBody>
       </p:sp>
@@ -3091,7 +3091,7 @@
               <a:rPr lang="es-ES" smtClean="0"/>
               <a:t>26/10/aa</a:t>
             </a:fld>
-            <a:endParaRPr lang="es-ES"/>
+            <a:endParaRPr lang="es-ES" dirty="0"/>
           </a:p>
         </p:txBody>
       </p:sp>
@@ -3110,7 +3110,7 @@
           <a:bodyPr/>
           <a:lstStyle/>
           <a:p>
-            <a:endParaRPr lang="es-ES"/>
+            <a:endParaRPr lang="es-ES" dirty="0"/>
           </a:p>
         </p:txBody>
       </p:sp>
@@ -3133,7 +3133,7 @@
               <a:rPr lang="es-ES" smtClean="0"/>
               <a:t>‹Nº›</a:t>
             </a:fld>
-            <a:endParaRPr lang="es-ES"/>
+            <a:endParaRPr lang="es-ES" dirty="0"/>
           </a:p>
         </p:txBody>
       </p:sp>
@@ -3271,7 +3271,7 @@
               <a:rPr lang="es-ES" smtClean="0"/>
               <a:t>26/10/aa</a:t>
             </a:fld>
-            <a:endParaRPr lang="es-ES"/>
+            <a:endParaRPr lang="es-ES" dirty="0"/>
           </a:p>
         </p:txBody>
       </p:sp>
@@ -3290,7 +3290,7 @@
           <a:bodyPr/>
           <a:lstStyle/>
           <a:p>
-            <a:endParaRPr lang="es-ES"/>
+            <a:endParaRPr lang="es-ES" dirty="0"/>
           </a:p>
         </p:txBody>
       </p:sp>
@@ -3313,7 +3313,7 @@
               <a:rPr lang="es-ES" smtClean="0"/>
               <a:t>‹Nº›</a:t>
             </a:fld>
-            <a:endParaRPr lang="es-ES"/>
+            <a:endParaRPr lang="es-ES" dirty="0"/>
           </a:p>
         </p:txBody>
       </p:sp>
@@ -3456,7 +3456,7 @@
               <a:rPr lang="es-ES" smtClean="0"/>
               <a:t>26/10/aa</a:t>
             </a:fld>
-            <a:endParaRPr lang="es-ES"/>
+            <a:endParaRPr lang="es-ES" dirty="0"/>
           </a:p>
         </p:txBody>
       </p:sp>
@@ -3480,7 +3480,7 @@
           <a:bodyPr/>
           <a:lstStyle/>
           <a:p>
-            <a:endParaRPr lang="es-ES"/>
+            <a:endParaRPr lang="es-ES" dirty="0"/>
           </a:p>
         </p:txBody>
       </p:sp>
@@ -3508,7 +3508,7 @@
               <a:rPr lang="es-ES" smtClean="0"/>
               <a:t>‹Nº›</a:t>
             </a:fld>
-            <a:endParaRPr lang="es-ES"/>
+            <a:endParaRPr lang="es-ES" dirty="0"/>
           </a:p>
         </p:txBody>
       </p:sp>
@@ -3712,7 +3712,7 @@
               <a:rPr lang="es-ES" smtClean="0"/>
               <a:t>26/10/aa</a:t>
             </a:fld>
-            <a:endParaRPr lang="es-ES"/>
+            <a:endParaRPr lang="es-ES" dirty="0"/>
           </a:p>
         </p:txBody>
       </p:sp>
@@ -3731,7 +3731,7 @@
           <a:bodyPr/>
           <a:lstStyle/>
           <a:p>
-            <a:endParaRPr lang="es-ES"/>
+            <a:endParaRPr lang="es-ES" dirty="0"/>
           </a:p>
         </p:txBody>
       </p:sp>
@@ -3759,7 +3759,7 @@
               <a:rPr lang="es-ES" smtClean="0"/>
               <a:t>‹Nº›</a:t>
             </a:fld>
-            <a:endParaRPr lang="es-ES"/>
+            <a:endParaRPr lang="es-ES" dirty="0"/>
           </a:p>
         </p:txBody>
       </p:sp>
@@ -4014,7 +4014,7 @@
               <a:rPr lang="es-ES" smtClean="0"/>
               <a:t>26/10/aa</a:t>
             </a:fld>
-            <a:endParaRPr lang="es-ES"/>
+            <a:endParaRPr lang="es-ES" dirty="0"/>
           </a:p>
         </p:txBody>
       </p:sp>
@@ -4033,7 +4033,7 @@
           <a:bodyPr/>
           <a:lstStyle/>
           <a:p>
-            <a:endParaRPr lang="es-ES"/>
+            <a:endParaRPr lang="es-ES" dirty="0"/>
           </a:p>
         </p:txBody>
       </p:sp>
@@ -4056,7 +4056,7 @@
               <a:rPr lang="es-ES" smtClean="0"/>
               <a:t>‹Nº›</a:t>
             </a:fld>
-            <a:endParaRPr lang="es-ES"/>
+            <a:endParaRPr lang="es-ES" dirty="0"/>
           </a:p>
         </p:txBody>
       </p:sp>
@@ -4456,7 +4456,7 @@
               <a:rPr lang="es-ES" smtClean="0"/>
               <a:t>26/10/aa</a:t>
             </a:fld>
-            <a:endParaRPr lang="es-ES"/>
+            <a:endParaRPr lang="es-ES" dirty="0"/>
           </a:p>
         </p:txBody>
       </p:sp>
@@ -4475,7 +4475,7 @@
           <a:bodyPr/>
           <a:lstStyle/>
           <a:p>
-            <a:endParaRPr lang="es-ES"/>
+            <a:endParaRPr lang="es-ES" dirty="0"/>
           </a:p>
         </p:txBody>
       </p:sp>
@@ -4498,7 +4498,7 @@
               <a:rPr lang="es-ES" smtClean="0"/>
               <a:t>‹Nº›</a:t>
             </a:fld>
-            <a:endParaRPr lang="es-ES"/>
+            <a:endParaRPr lang="es-ES" dirty="0"/>
           </a:p>
         </p:txBody>
       </p:sp>
@@ -4574,7 +4574,7 @@
               <a:rPr lang="es-ES" smtClean="0"/>
               <a:t>26/10/aa</a:t>
             </a:fld>
-            <a:endParaRPr lang="es-ES"/>
+            <a:endParaRPr lang="es-ES" dirty="0"/>
           </a:p>
         </p:txBody>
       </p:sp>
@@ -4593,7 +4593,7 @@
           <a:bodyPr/>
           <a:lstStyle/>
           <a:p>
-            <a:endParaRPr lang="es-ES"/>
+            <a:endParaRPr lang="es-ES" dirty="0"/>
           </a:p>
         </p:txBody>
       </p:sp>
@@ -4616,7 +4616,7 @@
               <a:rPr lang="es-ES" smtClean="0"/>
               <a:t>‹Nº›</a:t>
             </a:fld>
-            <a:endParaRPr lang="es-ES"/>
+            <a:endParaRPr lang="es-ES" dirty="0"/>
           </a:p>
         </p:txBody>
       </p:sp>
@@ -4669,7 +4669,7 @@
               <a:rPr lang="es-ES" smtClean="0"/>
               <a:t>26/10/aa</a:t>
             </a:fld>
-            <a:endParaRPr lang="es-ES"/>
+            <a:endParaRPr lang="es-ES" dirty="0"/>
           </a:p>
         </p:txBody>
       </p:sp>
@@ -4688,7 +4688,7 @@
           <a:bodyPr/>
           <a:lstStyle/>
           <a:p>
-            <a:endParaRPr lang="es-ES"/>
+            <a:endParaRPr lang="es-ES" dirty="0"/>
           </a:p>
         </p:txBody>
       </p:sp>
@@ -4711,7 +4711,7 @@
               <a:rPr lang="es-ES" smtClean="0"/>
               <a:t>‹Nº›</a:t>
             </a:fld>
-            <a:endParaRPr lang="es-ES"/>
+            <a:endParaRPr lang="es-ES" dirty="0"/>
           </a:p>
         </p:txBody>
       </p:sp>
@@ -4952,7 +4952,7 @@
               <a:rPr lang="es-ES" smtClean="0"/>
               <a:t>26/10/aa</a:t>
             </a:fld>
-            <a:endParaRPr lang="es-ES"/>
+            <a:endParaRPr lang="es-ES" dirty="0"/>
           </a:p>
         </p:txBody>
       </p:sp>
@@ -4971,7 +4971,7 @@
           <a:bodyPr/>
           <a:lstStyle/>
           <a:p>
-            <a:endParaRPr lang="es-ES"/>
+            <a:endParaRPr lang="es-ES" dirty="0"/>
           </a:p>
         </p:txBody>
       </p:sp>
@@ -4994,7 +4994,7 @@
               <a:rPr lang="es-ES" smtClean="0"/>
               <a:t>‹Nº›</a:t>
             </a:fld>
-            <a:endParaRPr lang="es-ES"/>
+            <a:endParaRPr lang="es-ES" dirty="0"/>
           </a:p>
         </p:txBody>
       </p:sp>
@@ -5150,7 +5150,7 @@
           </a:lstStyle>
           <a:p>
             <a:r>
-              <a:rPr lang="es-ES" smtClean="0"/>
+              <a:rPr lang="es-ES" dirty="0" smtClean="0"/>
               <a:t>Haga clic en el icono para agregar una imagen</a:t>
             </a:r>
             <a:endParaRPr lang="en-US" dirty="0"/>
@@ -5243,7 +5243,7 @@
               <a:rPr lang="es-ES" smtClean="0"/>
               <a:t>26/10/aa</a:t>
             </a:fld>
-            <a:endParaRPr lang="es-ES"/>
+            <a:endParaRPr lang="es-ES" dirty="0"/>
           </a:p>
         </p:txBody>
       </p:sp>
@@ -5262,7 +5262,7 @@
           <a:bodyPr/>
           <a:lstStyle/>
           <a:p>
-            <a:endParaRPr lang="es-ES"/>
+            <a:endParaRPr lang="es-ES" dirty="0"/>
           </a:p>
         </p:txBody>
       </p:sp>
@@ -5285,7 +5285,7 @@
               <a:rPr lang="es-ES" smtClean="0"/>
               <a:t>‹Nº›</a:t>
             </a:fld>
-            <a:endParaRPr lang="es-ES"/>
+            <a:endParaRPr lang="es-ES" dirty="0"/>
           </a:p>
         </p:txBody>
       </p:sp>
@@ -5767,7 +5767,7 @@
               <a:rPr lang="es-ES" smtClean="0"/>
               <a:t>26/10/aa</a:t>
             </a:fld>
-            <a:endParaRPr lang="es-ES"/>
+            <a:endParaRPr lang="es-ES" dirty="0"/>
           </a:p>
         </p:txBody>
       </p:sp>
@@ -5804,7 +5804,7 @@
             </a:lvl1pPr>
           </a:lstStyle>
           <a:p>
-            <a:endParaRPr lang="es-ES"/>
+            <a:endParaRPr lang="es-ES" dirty="0"/>
           </a:p>
         </p:txBody>
       </p:sp>
@@ -5845,7 +5845,7 @@
               <a:rPr lang="es-ES" smtClean="0"/>
               <a:t>‹Nº›</a:t>
             </a:fld>
-            <a:endParaRPr lang="es-ES"/>
+            <a:endParaRPr lang="es-ES" dirty="0"/>
           </a:p>
         </p:txBody>
       </p:sp>
@@ -6589,7 +6589,7 @@
               <a:t>[1 </a:t>
             </a:r>
             <a:r>
-              <a:rPr lang="es-ES" sz="1400" dirty="0" err="1" smtClean="0"/>
+              <a:rPr lang="es-ES" sz="1400" dirty="0" smtClean="0"/>
               <a:t>sdk</a:t>
             </a:r>
             <a:r>
@@ -6943,7 +6943,7 @@
           <a:lstStyle/>
           <a:p>
             <a:r>
-              <a:rPr lang="es-ES" dirty="0" err="1" smtClean="0"/>
+              <a:rPr lang="es-ES" dirty="0" smtClean="0"/>
               <a:t>ColorBasic</a:t>
             </a:r>
             <a:r>
@@ -6951,7 +6951,7 @@
               <a:t> – </a:t>
             </a:r>
             <a:r>
-              <a:rPr lang="es-ES" dirty="0" err="1" smtClean="0"/>
+              <a:rPr lang="es-ES" dirty="0" smtClean="0"/>
               <a:t>BodyBasic</a:t>
             </a:r>
             <a:r>
@@ -6989,7 +6989,7 @@
               <a:t>Nuestro objetivo primero ha sido mezclar los proyectos WPF de </a:t>
             </a:r>
             <a:r>
-              <a:rPr lang="es-ES" dirty="0" err="1" smtClean="0"/>
+              <a:rPr lang="es-ES" dirty="0" smtClean="0"/>
               <a:t>ColorBasic</a:t>
             </a:r>
             <a:r>
@@ -6997,7 +6997,7 @@
               <a:t> y </a:t>
             </a:r>
             <a:r>
-              <a:rPr lang="es-ES" dirty="0" err="1" smtClean="0"/>
+              <a:rPr lang="es-ES" dirty="0" smtClean="0"/>
               <a:t>BodyBasic</a:t>
             </a:r>
             <a:r>
@@ -7021,7 +7021,7 @@
               <a:t>Ahora mezclamos el código descargado (</a:t>
             </a:r>
             <a:r>
-              <a:rPr lang="es-ES" dirty="0" err="1" smtClean="0"/>
+              <a:rPr lang="es-ES" dirty="0" smtClean="0"/>
               <a:t>MainWindow.xaml.cs</a:t>
             </a:r>
             <a:r>
@@ -7040,7 +7040,7 @@
               <a:t>- Primero añadimos los </a:t>
             </a:r>
             <a:r>
-              <a:rPr lang="es-ES" sz="1800" dirty="0" err="1" smtClean="0"/>
+              <a:rPr lang="es-ES" sz="1800" dirty="0" smtClean="0"/>
               <a:t>using</a:t>
             </a:r>
             <a:r>
@@ -7055,7 +7055,7 @@
               <a:t>- Añadimos la referencia: Proyecto, Añadir referencia, Ensamblados, Extensiones, </a:t>
             </a:r>
             <a:r>
-              <a:rPr lang="es-ES" sz="1800" dirty="0" err="1" smtClean="0"/>
+              <a:rPr lang="es-ES" sz="1800" dirty="0" smtClean="0"/>
               <a:t>Microsoft.Kinect</a:t>
             </a:r>
             <a:r>
@@ -7078,7 +7078,7 @@
               <a:t>partial class </a:t>
             </a:r>
             <a:r>
-              <a:rPr lang="en-US" sz="1800" dirty="0" err="1"/>
+              <a:rPr lang="en-US" sz="1800" dirty="0"/>
               <a:t>MainWindow</a:t>
             </a:r>
             <a:r>
@@ -7086,7 +7086,7 @@
               <a:t> : Window, </a:t>
             </a:r>
             <a:r>
-              <a:rPr lang="en-US" sz="1800" dirty="0" err="1" smtClean="0"/>
+              <a:rPr lang="en-US" sz="1800" dirty="0" smtClean="0"/>
               <a:t>INotifyPropertyChanged</a:t>
             </a:r>
             <a:r>
@@ -7094,7 +7094,7 @@
               <a:t>” </a:t>
             </a:r>
             <a:r>
-              <a:rPr lang="en-US" sz="1800" dirty="0" err="1" smtClean="0"/>
+              <a:rPr lang="en-US" sz="1800" dirty="0" smtClean="0"/>
               <a:t>en</a:t>
             </a:r>
             <a:r>
@@ -7163,7 +7163,7 @@
           <a:lstStyle/>
           <a:p>
             <a:r>
-              <a:rPr lang="es-ES" dirty="0" err="1"/>
+              <a:rPr lang="es-ES" dirty="0"/>
               <a:t>ColorBasic</a:t>
             </a:r>
             <a:r>
@@ -7175,7 +7175,7 @@
               <a:t>– </a:t>
             </a:r>
             <a:r>
-              <a:rPr lang="es-ES" dirty="0" err="1" smtClean="0"/>
+              <a:rPr lang="es-ES" dirty="0" smtClean="0"/>
               <a:t>BodyBasic</a:t>
             </a:r>
             <a:r>
@@ -7223,7 +7223,7 @@
               <a:t>Creamos la carpeta </a:t>
             </a:r>
             <a:r>
-              <a:rPr lang="es-ES" dirty="0" err="1" smtClean="0"/>
+              <a:rPr lang="es-ES" dirty="0" smtClean="0"/>
               <a:t>lib</a:t>
             </a:r>
             <a:r>
@@ -7237,7 +7237,7 @@
               <a:t>Ahora en el .</a:t>
             </a:r>
             <a:r>
-              <a:rPr lang="es-ES" dirty="0" err="1" smtClean="0"/>
+              <a:rPr lang="es-ES" dirty="0" smtClean="0"/>
               <a:t>cs</a:t>
             </a:r>
             <a:r>
@@ -7256,7 +7256,7 @@
               <a:t>“</a:t>
             </a:r>
             <a:r>
-              <a:rPr lang="es-ES" dirty="0" err="1" smtClean="0"/>
+              <a:rPr lang="es-ES" dirty="0" smtClean="0"/>
               <a:t>if</a:t>
             </a:r>
             <a:r>
@@ -7264,7 +7264,7 @@
               <a:t> (</a:t>
             </a:r>
             <a:r>
-              <a:rPr lang="es-ES" dirty="0" err="1" smtClean="0"/>
+              <a:rPr lang="es-ES" dirty="0" smtClean="0"/>
               <a:t>this.bodies</a:t>
             </a:r>
             <a:r>
@@ -7272,7 +7272,7 @@
               <a:t> != </a:t>
             </a:r>
             <a:r>
-              <a:rPr lang="es-ES" dirty="0" err="1" smtClean="0"/>
+              <a:rPr lang="es-ES" dirty="0" smtClean="0"/>
               <a:t>null</a:t>
             </a:r>
             <a:r>
@@ -7280,7 +7280,7 @@
               <a:t>)” todo ese </a:t>
             </a:r>
             <a:r>
-              <a:rPr lang="es-ES" dirty="0" err="1" smtClean="0"/>
+              <a:rPr lang="es-ES" dirty="0" smtClean="0"/>
               <a:t>if</a:t>
             </a:r>
             <a:r>
@@ -7294,15 +7294,15 @@
               <a:t>En la línea 112 del .</a:t>
             </a:r>
             <a:r>
-              <a:rPr lang="es-ES" smtClean="0"/>
-              <a:t>cs, </a:t>
-            </a:r>
-            <a:r>
-              <a:rPr lang="es-ES" dirty="0" smtClean="0"/>
-              <a:t>tendremos que cambiar “</a:t>
-            </a:r>
-            <a:r>
-              <a:rPr lang="es-ES" dirty="0" err="1" smtClean="0"/>
+              <a:rPr lang="es-ES" dirty="0" smtClean="0"/>
+              <a:t>cs</a:t>
+            </a:r>
+            <a:r>
+              <a:rPr lang="es-ES" dirty="0" smtClean="0"/>
+              <a:t>, tendremos que cambiar “</a:t>
+            </a:r>
+            <a:r>
+              <a:rPr lang="es-ES" dirty="0" smtClean="0"/>
               <a:t>kinectSensor.Default</a:t>
             </a:r>
             <a:r>
@@ -7310,7 +7310,7 @@
               <a:t>” por “</a:t>
             </a:r>
             <a:r>
-              <a:rPr lang="es-ES" dirty="0" err="1" smtClean="0"/>
+              <a:rPr lang="es-ES" dirty="0" smtClean="0"/>
               <a:t>kinectSensor.GetDefault</a:t>
             </a:r>
             <a:r>
@@ -7371,7 +7371,7 @@
           <a:lstStyle/>
           <a:p>
             <a:r>
-              <a:rPr lang="es-ES" dirty="0" err="1"/>
+              <a:rPr lang="es-ES" dirty="0"/>
               <a:t>ColorBasic</a:t>
             </a:r>
             <a:r>
@@ -7379,7 +7379,7 @@
               <a:t> – </a:t>
             </a:r>
             <a:r>
-              <a:rPr lang="es-ES" dirty="0" err="1"/>
+              <a:rPr lang="es-ES" dirty="0"/>
               <a:t>BodyBasic</a:t>
             </a:r>
             <a:r>
@@ -7419,7 +7419,7 @@
               <a:t>Ahora en el fichero </a:t>
             </a:r>
             <a:r>
-              <a:rPr lang="es-ES" dirty="0" err="1" smtClean="0"/>
+              <a:rPr lang="es-ES" dirty="0" smtClean="0"/>
               <a:t>MainWindow.xaml</a:t>
             </a:r>
             <a:r>
@@ -7427,7 +7427,7 @@
               <a:t> copiamos desde “</a:t>
             </a:r>
             <a:r>
-              <a:rPr lang="es-ES" dirty="0" err="1" smtClean="0"/>
+              <a:rPr lang="es-ES" dirty="0" smtClean="0"/>
               <a:t>Title</a:t>
             </a:r>
             <a:r>
@@ -7596,7 +7596,7 @@
               <a:t>Para mostrar la posición inicial, vamos a añadir una imagen en el borde inferior de la ventana, con la posición a realizar. Para ellos solo debemos arrastrar la imagen al .</a:t>
             </a:r>
             <a:r>
-              <a:rPr lang="es-ES" dirty="0" err="1" smtClean="0"/>
+              <a:rPr lang="es-ES" dirty="0" smtClean="0"/>
               <a:t>xaml</a:t>
             </a:r>
             <a:r>
@@ -7611,7 +7611,7 @@
               <a:t>En el .</a:t>
             </a:r>
             <a:r>
-              <a:rPr lang="es-ES" dirty="0" err="1" smtClean="0"/>
+              <a:rPr lang="es-ES" dirty="0" smtClean="0"/>
               <a:t>cs</a:t>
             </a:r>
             <a:r>
@@ -7619,7 +7619,7 @@
               <a:t> hacemos que cuando se inicie el programa sea visible con: “</a:t>
             </a:r>
             <a:r>
-              <a:rPr lang="es-ES" dirty="0" err="1"/>
+              <a:rPr lang="es-ES" dirty="0"/>
               <a:t>PosicionInicio.Visibility</a:t>
             </a:r>
             <a:r>
@@ -7627,7 +7627,7 @@
               <a:t> = </a:t>
             </a:r>
             <a:r>
-              <a:rPr lang="es-ES" dirty="0" err="1" smtClean="0"/>
+              <a:rPr lang="es-ES" dirty="0" smtClean="0"/>
               <a:t>System.Windows.Visibility.Visible</a:t>
             </a:r>
             <a:r>
@@ -7837,6 +7837,10 @@
           <a:bodyPr/>
           <a:lstStyle/>
           <a:p>
+            <a:r>
+              <a:rPr lang="es-ES" dirty="0" smtClean="0"/>
+              <a:t>Fijar Posición y ayudar al usuario</a:t>
+            </a:r>
             <a:endParaRPr lang="es-ES" dirty="0"/>
           </a:p>
         </p:txBody>
@@ -7860,6 +7864,28 @@
         <p:txBody>
           <a:bodyPr/>
           <a:lstStyle/>
+          <a:p>
+            <a:r>
+              <a:rPr lang="es-ES" dirty="0" smtClean="0"/>
+              <a:t>Primero nos hemos basado en el </a:t>
+            </a:r>
+            <a:r>
+              <a:rPr lang="es-ES" dirty="0" err="1" smtClean="0"/>
+              <a:t>BodyBasic</a:t>
+            </a:r>
+            <a:r>
+              <a:rPr lang="es-ES" dirty="0" smtClean="0"/>
+              <a:t> para mostrar si el usuario se sale de la franja con el método “</a:t>
+            </a:r>
+            <a:r>
+              <a:rPr lang="es-ES" dirty="0" err="1" smtClean="0"/>
+              <a:t>DrawClippedEdges</a:t>
+            </a:r>
+            <a:r>
+              <a:rPr lang="es-ES" smtClean="0"/>
+              <a:t>” </a:t>
+            </a:r>
+          </a:p>
           <a:p>
             <a:endParaRPr lang="es-ES" dirty="0"/>
           </a:p>

</xml_diff>

<commit_message>
Añadimos Points y Controlador de Movimientos
</commit_message>
<xml_diff>
--- a/Presentación Práctica 1.pptx
+++ b/Presentación Práctica 1.pptx
@@ -740,7 +740,7 @@
           </a:ln>
           <a:extLst>
             <a:ext uri="{91240B29-F687-4f45-9708-019B960494DF}">
-              <a14:hiddenLine xmlns:a14="http://schemas.microsoft.com/office/drawing/2010/main" xmlns="" w="9525">
+              <a14:hiddenLine xmlns="" xmlns:a14="http://schemas.microsoft.com/office/drawing/2010/main" w="9525">
                 <a:solidFill>
                   <a:srgbClr val="000000"/>
                 </a:solidFill>
@@ -795,7 +795,7 @@
           </a:ln>
           <a:extLst>
             <a:ext uri="{91240B29-F687-4f45-9708-019B960494DF}">
-              <a14:hiddenLine xmlns:a14="http://schemas.microsoft.com/office/drawing/2010/main" xmlns="" w="9525">
+              <a14:hiddenLine xmlns="" xmlns:a14="http://schemas.microsoft.com/office/drawing/2010/main" w="9525">
                 <a:solidFill>
                   <a:srgbClr val="000000"/>
                 </a:solidFill>
@@ -6398,6 +6398,14 @@
           <a:bodyPr/>
           <a:lstStyle/>
           <a:p>
+            <a:r>
+              <a:rPr lang="es-ES" dirty="0"/>
+              <a:t>Fijar Posición y ayudar al </a:t>
+            </a:r>
+            <a:r>
+              <a:rPr lang="es-ES" dirty="0" smtClean="0"/>
+              <a:t>usuario II</a:t>
+            </a:r>
             <a:endParaRPr lang="es-ES" dirty="0"/>
           </a:p>
         </p:txBody>
@@ -6422,10 +6430,67 @@
           <a:bodyPr/>
           <a:lstStyle/>
           <a:p>
-            <a:endParaRPr lang="es-ES" dirty="0"/>
-          </a:p>
-        </p:txBody>
-      </p:sp>
+            <a:r>
+              <a:rPr lang="es-ES" dirty="0" smtClean="0"/>
+              <a:t>Quedaría:</a:t>
+            </a:r>
+          </a:p>
+          <a:p>
+            <a:endParaRPr lang="es-ES" dirty="0"/>
+          </a:p>
+          <a:p>
+            <a:endParaRPr lang="es-ES" dirty="0" smtClean="0"/>
+          </a:p>
+          <a:p>
+            <a:endParaRPr lang="es-ES" dirty="0"/>
+          </a:p>
+          <a:p>
+            <a:endParaRPr lang="es-ES" dirty="0" smtClean="0"/>
+          </a:p>
+          <a:p>
+            <a:endParaRPr lang="es-ES" dirty="0"/>
+          </a:p>
+          <a:p>
+            <a:endParaRPr lang="es-ES" dirty="0" smtClean="0"/>
+          </a:p>
+          <a:p>
+            <a:endParaRPr lang="es-ES" dirty="0"/>
+          </a:p>
+          <a:p>
+            <a:endParaRPr lang="es-ES" dirty="0"/>
+          </a:p>
+        </p:txBody>
+      </p:sp>
+      <p:pic>
+        <p:nvPicPr>
+          <p:cNvPr id="4" name="Imagen 3"/>
+          <p:cNvPicPr>
+            <a:picLocks noChangeAspect="1"/>
+          </p:cNvPicPr>
+          <p:nvPr/>
+        </p:nvPicPr>
+        <p:blipFill>
+          <a:blip r:embed="rId2">
+            <a:extLst>
+              <a:ext uri="{28A0092B-C50C-407E-A947-70E740481C1C}">
+                <a14:useLocalDpi xmlns:a14="http://schemas.microsoft.com/office/drawing/2010/main" val="0"/>
+              </a:ext>
+            </a:extLst>
+          </a:blip>
+          <a:stretch>
+            <a:fillRect/>
+          </a:stretch>
+        </p:blipFill>
+        <p:spPr>
+          <a:xfrm>
+            <a:off x="600891" y="2151920"/>
+            <a:ext cx="7863840" cy="4205414"/>
+          </a:xfrm>
+          <a:prstGeom prst="rect">
+            <a:avLst/>
+          </a:prstGeom>
+        </p:spPr>
+      </p:pic>
     </p:spTree>
     <p:extLst>
       <p:ext uri="{BB962C8B-B14F-4D97-AF65-F5344CB8AC3E}">
@@ -6586,11 +6651,7 @@
           <a:p>
             <a:r>
               <a:rPr lang="es-ES" sz="1400" dirty="0" smtClean="0"/>
-              <a:t>[1 </a:t>
-            </a:r>
-            <a:r>
-              <a:rPr lang="es-ES" sz="1400" dirty="0" smtClean="0"/>
-              <a:t>sdk</a:t>
+              <a:t>[1 sdk</a:t>
             </a:r>
             <a:r>
               <a:rPr lang="es-ES" sz="1400" dirty="0"/>
@@ -6666,6 +6727,28 @@
               <a:t>/</a:t>
             </a:r>
             <a:endParaRPr lang="es-ES" sz="1400" dirty="0" smtClean="0"/>
+          </a:p>
+          <a:p>
+            <a:r>
+              <a:rPr lang="es-ES" sz="1400" dirty="0"/>
+              <a:t>[5joints] </a:t>
+            </a:r>
+            <a:r>
+              <a:rPr lang="es-ES" sz="1400" dirty="0">
+                <a:hlinkClick r:id="rId6"/>
+              </a:rPr>
+              <a:t>https://</a:t>
+            </a:r>
+            <a:r>
+              <a:rPr lang="es-ES" sz="1400" dirty="0" smtClean="0">
+                <a:hlinkClick r:id="rId6"/>
+              </a:rPr>
+              <a:t>i-msdn.sec.s-msft.com/dynimg/IC741371.png</a:t>
+            </a:r>
+            <a:endParaRPr lang="es-ES" sz="1400" dirty="0" smtClean="0"/>
+          </a:p>
+          <a:p>
+            <a:endParaRPr lang="es-ES" sz="1400" dirty="0"/>
           </a:p>
           <a:p>
             <a:endParaRPr lang="es-ES" sz="1400" dirty="0"/>
@@ -6944,19 +7027,7 @@
           <a:p>
             <a:r>
               <a:rPr lang="es-ES" dirty="0" smtClean="0"/>
-              <a:t>ColorBasic</a:t>
-            </a:r>
-            <a:r>
-              <a:rPr lang="es-ES" dirty="0" smtClean="0"/>
-              <a:t> – </a:t>
-            </a:r>
-            <a:r>
-              <a:rPr lang="es-ES" dirty="0" smtClean="0"/>
-              <a:t>BodyBasic</a:t>
-            </a:r>
-            <a:r>
-              <a:rPr lang="es-ES" dirty="0" smtClean="0"/>
-              <a:t> I</a:t>
+              <a:t>ColorBasic – BodyBasic I</a:t>
             </a:r>
             <a:endParaRPr lang="es-ES" dirty="0"/>
           </a:p>
@@ -6986,23 +7057,7 @@
           <a:p>
             <a:r>
               <a:rPr lang="es-ES" dirty="0" smtClean="0"/>
-              <a:t>Nuestro objetivo primero ha sido mezclar los proyectos WPF de </a:t>
-            </a:r>
-            <a:r>
-              <a:rPr lang="es-ES" dirty="0" smtClean="0"/>
-              <a:t>ColorBasic</a:t>
-            </a:r>
-            <a:r>
-              <a:rPr lang="es-ES" dirty="0" smtClean="0"/>
-              <a:t> y </a:t>
-            </a:r>
-            <a:r>
-              <a:rPr lang="es-ES" dirty="0" smtClean="0"/>
-              <a:t>BodyBasic</a:t>
-            </a:r>
-            <a:r>
-              <a:rPr lang="es-ES" dirty="0" smtClean="0"/>
-              <a:t> proporcionados por el SDK.</a:t>
+              <a:t>Nuestro objetivo primero ha sido mezclar los proyectos WPF de ColorBasic y BodyBasic proporcionados por el SDK.</a:t>
             </a:r>
           </a:p>
           <a:p>
@@ -7018,15 +7073,7 @@
           <a:p>
             <a:r>
               <a:rPr lang="es-ES" dirty="0" smtClean="0"/>
-              <a:t>Ahora mezclamos el código descargado (</a:t>
-            </a:r>
-            <a:r>
-              <a:rPr lang="es-ES" dirty="0" smtClean="0"/>
-              <a:t>MainWindow.xaml.cs</a:t>
-            </a:r>
-            <a:r>
-              <a:rPr lang="es-ES" dirty="0" smtClean="0"/>
-              <a:t>) junto con el nuestro:</a:t>
+              <a:t>Ahora mezclamos el código descargado (MainWindow.xaml.cs) junto con el nuestro:</a:t>
             </a:r>
             <a:r>
               <a:rPr lang="es-ES" dirty="0"/>
@@ -7037,30 +7084,14 @@
             </a:br>
             <a:r>
               <a:rPr lang="es-ES" sz="1800" dirty="0" smtClean="0"/>
-              <a:t>- Primero añadimos los </a:t>
-            </a:r>
-            <a:r>
-              <a:rPr lang="es-ES" sz="1800" dirty="0" smtClean="0"/>
-              <a:t>using</a:t>
-            </a:r>
-            <a:r>
-              <a:rPr lang="es-ES" sz="1800" dirty="0" smtClean="0"/>
-              <a:t> restantes.</a:t>
+              <a:t>- Primero añadimos los using restantes.</a:t>
             </a:r>
             <a:br>
               <a:rPr lang="es-ES" sz="1800" dirty="0" smtClean="0"/>
             </a:br>
             <a:r>
               <a:rPr lang="es-ES" sz="1800" dirty="0" smtClean="0"/>
-              <a:t>- Añadimos la referencia: Proyecto, Añadir referencia, Ensamblados, Extensiones, </a:t>
-            </a:r>
-            <a:r>
-              <a:rPr lang="es-ES" sz="1800" dirty="0" smtClean="0"/>
-              <a:t>Microsoft.Kinect</a:t>
-            </a:r>
-            <a:r>
-              <a:rPr lang="es-ES" sz="1800" dirty="0" smtClean="0"/>
-              <a:t/>
+              <a:t>- Añadimos la referencia: Proyecto, Añadir referencia, Ensamblados, Extensiones, Microsoft.Kinect</a:t>
             </a:r>
             <a:br>
               <a:rPr lang="es-ES" sz="1800" dirty="0" smtClean="0"/>
@@ -7075,31 +7106,11 @@
             </a:r>
             <a:r>
               <a:rPr lang="en-US" sz="1800" dirty="0"/>
-              <a:t>partial class </a:t>
-            </a:r>
-            <a:r>
-              <a:rPr lang="en-US" sz="1800" dirty="0"/>
-              <a:t>MainWindow</a:t>
-            </a:r>
-            <a:r>
-              <a:rPr lang="en-US" sz="1800" dirty="0"/>
-              <a:t> : Window, </a:t>
+              <a:t>partial class MainWindow : Window, </a:t>
             </a:r>
             <a:r>
               <a:rPr lang="en-US" sz="1800" dirty="0" smtClean="0"/>
-              <a:t>INotifyPropertyChanged</a:t>
-            </a:r>
-            <a:r>
-              <a:rPr lang="en-US" sz="1800" dirty="0" smtClean="0"/>
-              <a:t>” </a:t>
-            </a:r>
-            <a:r>
-              <a:rPr lang="en-US" sz="1800" dirty="0" smtClean="0"/>
-              <a:t>en</a:t>
-            </a:r>
-            <a:r>
-              <a:rPr lang="en-US" sz="1800" dirty="0" smtClean="0"/>
-              <a:t> Adelante.</a:t>
+              <a:t>INotifyPropertyChanged” en Adelante.</a:t>
             </a:r>
             <a:r>
               <a:rPr lang="es-ES" sz="1800" dirty="0"/>
@@ -7164,23 +7175,11 @@
           <a:p>
             <a:r>
               <a:rPr lang="es-ES" dirty="0"/>
-              <a:t>ColorBasic</a:t>
-            </a:r>
-            <a:r>
-              <a:rPr lang="es-ES" dirty="0"/>
-              <a:t> </a:t>
+              <a:t>ColorBasic </a:t>
             </a:r>
             <a:r>
               <a:rPr lang="es-ES" dirty="0" smtClean="0"/>
-              <a:t>– </a:t>
-            </a:r>
-            <a:r>
-              <a:rPr lang="es-ES" dirty="0" smtClean="0"/>
-              <a:t>BodyBasic</a:t>
-            </a:r>
-            <a:r>
-              <a:rPr lang="es-ES" dirty="0" smtClean="0"/>
-              <a:t> II</a:t>
+              <a:t>– BodyBasic II</a:t>
             </a:r>
             <a:endParaRPr lang="es-ES" dirty="0"/>
           </a:p>
@@ -7220,29 +7219,13 @@
           <a:p>
             <a:r>
               <a:rPr lang="es-ES" dirty="0" smtClean="0"/>
-              <a:t>Creamos la carpeta </a:t>
-            </a:r>
+              <a:t>Creamos la carpeta lib dentro del proyecto, copiamos lo descargado. En el proyecto nos vamos a Proyecto, Examinar, Reciente y buscamos “WriteableBitmapEx.Wpf.dll” y la añadimos.</a:t>
+            </a:r>
+          </a:p>
+          <a:p>
             <a:r>
               <a:rPr lang="es-ES" dirty="0" smtClean="0"/>
-              <a:t>lib</a:t>
-            </a:r>
-            <a:r>
-              <a:rPr lang="es-ES" dirty="0" smtClean="0"/>
-              <a:t> dentro del proyecto, copiamos lo descargado. En el proyecto nos vamos a Proyecto, Examinar, Reciente y buscamos “WriteableBitmapEx.Wpf.dll” y la añadimos.</a:t>
-            </a:r>
-          </a:p>
-          <a:p>
-            <a:r>
-              <a:rPr lang="es-ES" dirty="0" smtClean="0"/>
-              <a:t>Ahora en el .</a:t>
-            </a:r>
-            <a:r>
-              <a:rPr lang="es-ES" dirty="0" smtClean="0"/>
-              <a:t>cs</a:t>
-            </a:r>
-            <a:r>
-              <a:rPr lang="es-ES" dirty="0" smtClean="0"/>
-              <a:t> vamos a eliminar, en la línea 223:</a:t>
+              <a:t>Ahora en el .cs vamos a eliminar, en la línea 223:</a:t>
             </a:r>
             <a:r>
               <a:rPr lang="es-ES" dirty="0"/>
@@ -7253,69 +7236,13 @@
             </a:br>
             <a:r>
               <a:rPr lang="es-ES" dirty="0" smtClean="0"/>
-              <a:t>“</a:t>
-            </a:r>
+              <a:t>“if (this.bodies != null)” todo ese if, ya que esa comprobación la realizamos antes. </a:t>
+            </a:r>
+          </a:p>
+          <a:p>
             <a:r>
               <a:rPr lang="es-ES" dirty="0" smtClean="0"/>
-              <a:t>if</a:t>
-            </a:r>
-            <a:r>
-              <a:rPr lang="es-ES" dirty="0" smtClean="0"/>
-              <a:t> (</a:t>
-            </a:r>
-            <a:r>
-              <a:rPr lang="es-ES" dirty="0" smtClean="0"/>
-              <a:t>this.bodies</a:t>
-            </a:r>
-            <a:r>
-              <a:rPr lang="es-ES" dirty="0" smtClean="0"/>
-              <a:t> != </a:t>
-            </a:r>
-            <a:r>
-              <a:rPr lang="es-ES" dirty="0" smtClean="0"/>
-              <a:t>null</a:t>
-            </a:r>
-            <a:r>
-              <a:rPr lang="es-ES" dirty="0" smtClean="0"/>
-              <a:t>)” todo ese </a:t>
-            </a:r>
-            <a:r>
-              <a:rPr lang="es-ES" dirty="0" smtClean="0"/>
-              <a:t>if</a:t>
-            </a:r>
-            <a:r>
-              <a:rPr lang="es-ES" dirty="0" smtClean="0"/>
-              <a:t>, ya que esa comprobación la realizamos antes. </a:t>
-            </a:r>
-          </a:p>
-          <a:p>
-            <a:r>
-              <a:rPr lang="es-ES" dirty="0" smtClean="0"/>
-              <a:t>En la línea 112 del .</a:t>
-            </a:r>
-            <a:r>
-              <a:rPr lang="es-ES" dirty="0" smtClean="0"/>
-              <a:t>cs</a:t>
-            </a:r>
-            <a:r>
-              <a:rPr lang="es-ES" dirty="0" smtClean="0"/>
-              <a:t>, tendremos que cambiar “</a:t>
-            </a:r>
-            <a:r>
-              <a:rPr lang="es-ES" dirty="0" smtClean="0"/>
-              <a:t>kinectSensor.Default</a:t>
-            </a:r>
-            <a:r>
-              <a:rPr lang="es-ES" dirty="0" smtClean="0"/>
-              <a:t>” por “</a:t>
-            </a:r>
-            <a:r>
-              <a:rPr lang="es-ES" dirty="0" smtClean="0"/>
-              <a:t>kinectSensor.GetDefault</a:t>
-            </a:r>
-            <a:r>
-              <a:rPr lang="es-ES" dirty="0" smtClean="0"/>
-              <a:t>()”</a:t>
+              <a:t>En la línea 112 del .cs, tendremos que cambiar “kinectSensor.Default” por “kinectSensor.GetDefault()”</a:t>
             </a:r>
           </a:p>
         </p:txBody>
@@ -7372,19 +7299,7 @@
           <a:p>
             <a:r>
               <a:rPr lang="es-ES" dirty="0"/>
-              <a:t>ColorBasic</a:t>
-            </a:r>
-            <a:r>
-              <a:rPr lang="es-ES" dirty="0"/>
-              <a:t> – </a:t>
-            </a:r>
-            <a:r>
-              <a:rPr lang="es-ES" dirty="0"/>
-              <a:t>BodyBasic</a:t>
-            </a:r>
-            <a:r>
-              <a:rPr lang="es-ES" dirty="0"/>
-              <a:t> </a:t>
+              <a:t>ColorBasic – BodyBasic </a:t>
             </a:r>
             <a:r>
               <a:rPr lang="es-ES" dirty="0" smtClean="0"/>
@@ -7416,23 +7331,7 @@
           <a:p>
             <a:r>
               <a:rPr lang="es-ES" dirty="0" smtClean="0"/>
-              <a:t>Ahora en el fichero </a:t>
-            </a:r>
-            <a:r>
-              <a:rPr lang="es-ES" dirty="0" smtClean="0"/>
-              <a:t>MainWindow.xaml</a:t>
-            </a:r>
-            <a:r>
-              <a:rPr lang="es-ES" dirty="0" smtClean="0"/>
-              <a:t> copiamos desde “</a:t>
-            </a:r>
-            <a:r>
-              <a:rPr lang="es-ES" dirty="0" smtClean="0"/>
-              <a:t>Title</a:t>
-            </a:r>
-            <a:r>
-              <a:rPr lang="es-ES" dirty="0" smtClean="0"/>
-              <a:t>” hasta el final. </a:t>
+              <a:t>Ahora en el fichero MainWindow.xaml copiamos desde “Title” hasta el final. </a:t>
             </a:r>
           </a:p>
           <a:p>
@@ -7593,46 +7492,22 @@
           <a:p>
             <a:r>
               <a:rPr lang="es-ES" dirty="0" smtClean="0"/>
-              <a:t>Para mostrar la posición inicial, vamos a añadir una imagen en el borde inferior de la ventana, con la posición a realizar. Para ellos solo debemos arrastrar la imagen al .</a:t>
-            </a:r>
+              <a:t>Para mostrar la posición inicial, vamos a añadir una imagen en el borde inferior de la ventana, con la posición a realizar. Para ellos solo debemos arrastrar la imagen al .xaml y colocarla y escalarla. </a:t>
+            </a:r>
+            <a:endParaRPr lang="es-ES" dirty="0"/>
+          </a:p>
+          <a:p>
             <a:r>
               <a:rPr lang="es-ES" dirty="0" smtClean="0"/>
-              <a:t>xaml</a:t>
+              <a:t>En el .cs hacemos que cuando se inicie el programa sea visible con: “</a:t>
+            </a:r>
+            <a:r>
+              <a:rPr lang="es-ES" dirty="0"/>
+              <a:t>PosicionInicio.Visibility = </a:t>
             </a:r>
             <a:r>
               <a:rPr lang="es-ES" dirty="0" smtClean="0"/>
-              <a:t> y colocarla y escalarla. </a:t>
-            </a:r>
-            <a:endParaRPr lang="es-ES" dirty="0"/>
-          </a:p>
-          <a:p>
-            <a:r>
-              <a:rPr lang="es-ES" dirty="0" smtClean="0"/>
-              <a:t>En el .</a:t>
-            </a:r>
-            <a:r>
-              <a:rPr lang="es-ES" dirty="0" smtClean="0"/>
-              <a:t>cs</a:t>
-            </a:r>
-            <a:r>
-              <a:rPr lang="es-ES" dirty="0" smtClean="0"/>
-              <a:t> hacemos que cuando se inicie el programa sea visible con: “</a:t>
-            </a:r>
-            <a:r>
-              <a:rPr lang="es-ES" dirty="0"/>
-              <a:t>PosicionInicio.Visibility</a:t>
-            </a:r>
-            <a:r>
-              <a:rPr lang="es-ES" dirty="0"/>
-              <a:t> = </a:t>
-            </a:r>
-            <a:r>
-              <a:rPr lang="es-ES" dirty="0" smtClean="0"/>
-              <a:t>System.Windows.Visibility.Visible</a:t>
-            </a:r>
-            <a:r>
-              <a:rPr lang="es-ES" dirty="0" smtClean="0"/>
-              <a:t>” cuando comienzan las tareas. </a:t>
+              <a:t>System.Windows.Visibility.Visible” cuando comienzan las tareas. </a:t>
             </a:r>
           </a:p>
           <a:p>
@@ -7839,7 +7714,11 @@
           <a:p>
             <a:r>
               <a:rPr lang="es-ES" dirty="0" smtClean="0"/>
-              <a:t>Fijar Posición y ayudar al usuario</a:t>
+              <a:t>Fijar Posición y ayudar al </a:t>
+            </a:r>
+            <a:r>
+              <a:rPr lang="es-ES" dirty="0" smtClean="0"/>
+              <a:t>usuario I</a:t>
             </a:r>
             <a:endParaRPr lang="es-ES" dirty="0"/>
           </a:p>
@@ -7858,11 +7737,13 @@
         <p:spPr>
           <a:xfrm>
             <a:off x="982133" y="1502229"/>
-            <a:ext cx="7704667" cy="4497587"/>
+            <a:ext cx="7704667" cy="5238205"/>
           </a:xfrm>
         </p:spPr>
         <p:txBody>
-          <a:bodyPr/>
+          <a:bodyPr>
+            <a:normAutofit/>
+          </a:bodyPr>
           <a:lstStyle/>
           <a:p>
             <a:r>
@@ -7882,9 +7763,63 @@
               <a:t>DrawClippedEdges</a:t>
             </a:r>
             <a:r>
-              <a:rPr lang="es-ES" smtClean="0"/>
+              <a:rPr lang="es-ES" dirty="0" smtClean="0"/>
               <a:t>” </a:t>
             </a:r>
+            <a:endParaRPr lang="es-ES" dirty="0" smtClean="0"/>
+          </a:p>
+          <a:p>
+            <a:r>
+              <a:rPr lang="es-ES" dirty="0" smtClean="0"/>
+              <a:t>Creamos los </a:t>
+            </a:r>
+            <a:r>
+              <a:rPr lang="es-ES" dirty="0" err="1" smtClean="0"/>
+              <a:t>Points</a:t>
+            </a:r>
+            <a:r>
+              <a:rPr lang="es-ES" dirty="0" smtClean="0"/>
+              <a:t> para guardar los puntos de las partes del cuerpo importantes como: cabeza, hombros, pies y manos.</a:t>
+            </a:r>
+          </a:p>
+          <a:p>
+            <a:r>
+              <a:rPr lang="es-ES" dirty="0" smtClean="0"/>
+              <a:t>Creamos la función para controlar los movimientos que debe hacer el usuario, como: moverse a algún lado, alejarse, levantar la mano…</a:t>
+            </a:r>
+          </a:p>
+          <a:p>
+            <a:r>
+              <a:rPr lang="es-ES" dirty="0" smtClean="0"/>
+              <a:t>Crear el </a:t>
+            </a:r>
+            <a:r>
+              <a:rPr lang="es-ES" dirty="0" err="1" smtClean="0"/>
+              <a:t>text</a:t>
+            </a:r>
+            <a:r>
+              <a:rPr lang="es-ES" dirty="0" smtClean="0"/>
+              <a:t> en el .</a:t>
+            </a:r>
+            <a:r>
+              <a:rPr lang="es-ES" dirty="0" err="1" smtClean="0"/>
+              <a:t>xaml</a:t>
+            </a:r>
+            <a:r>
+              <a:rPr lang="es-ES" dirty="0" smtClean="0"/>
+              <a:t> para mostrar el movimiento.</a:t>
+            </a:r>
+          </a:p>
+          <a:p>
+            <a:r>
+              <a:rPr lang="es-ES" dirty="0" smtClean="0"/>
+              <a:t>Hemos usado esta imagen para ver los puntos importantes </a:t>
+            </a:r>
+            <a:r>
+              <a:rPr lang="es-ES" sz="1300" dirty="0" smtClean="0"/>
+              <a:t>[5joints]</a:t>
+            </a:r>
+            <a:endParaRPr lang="es-ES" sz="1300" dirty="0" smtClean="0"/>
           </a:p>
           <a:p>
             <a:endParaRPr lang="es-ES" dirty="0"/>

</xml_diff>

<commit_message>
Modificaciones menores de pequeños errores
</commit_message>
<xml_diff>
--- a/Presentación Práctica 1.pptx
+++ b/Presentación Práctica 1.pptx
@@ -16,7 +16,11 @@
     <p:sldId id="265" r:id="rId10"/>
     <p:sldId id="266" r:id="rId11"/>
     <p:sldId id="267" r:id="rId12"/>
-    <p:sldId id="261" r:id="rId13"/>
+    <p:sldId id="268" r:id="rId13"/>
+    <p:sldId id="269" r:id="rId14"/>
+    <p:sldId id="270" r:id="rId15"/>
+    <p:sldId id="271" r:id="rId16"/>
+    <p:sldId id="261" r:id="rId17"/>
   </p:sldIdLst>
   <p:sldSz cx="9144000" cy="6858000" type="screen4x3"/>
   <p:notesSz cx="6858000" cy="9144000"/>
@@ -639,7 +643,7 @@
           <a:p>
             <a:fld id="{E8895E6F-FE7D-47F3-BF3F-C434BE78B7A5}" type="datetimeFigureOut">
               <a:rPr lang="es-ES" smtClean="0"/>
-              <a:t>26/10/aa</a:t>
+              <a:t>29/10/aa</a:t>
             </a:fld>
             <a:endParaRPr lang="es-ES" dirty="0"/>
           </a:p>
@@ -740,7 +744,7 @@
           </a:ln>
           <a:extLst>
             <a:ext uri="{91240B29-F687-4f45-9708-019B960494DF}">
-              <a14:hiddenLine xmlns="" xmlns:a14="http://schemas.microsoft.com/office/drawing/2010/main" w="9525">
+              <a14:hiddenLine xmlns:a14="http://schemas.microsoft.com/office/drawing/2010/main" xmlns="" w="9525">
                 <a:solidFill>
                   <a:srgbClr val="000000"/>
                 </a:solidFill>
@@ -795,7 +799,7 @@
           </a:ln>
           <a:extLst>
             <a:ext uri="{91240B29-F687-4f45-9708-019B960494DF}">
-              <a14:hiddenLine xmlns="" xmlns:a14="http://schemas.microsoft.com/office/drawing/2010/main" w="9525">
+              <a14:hiddenLine xmlns:a14="http://schemas.microsoft.com/office/drawing/2010/main" xmlns="" w="9525">
                 <a:solidFill>
                   <a:srgbClr val="000000"/>
                 </a:solidFill>
@@ -1050,7 +1054,7 @@
           <a:p>
             <a:fld id="{E8895E6F-FE7D-47F3-BF3F-C434BE78B7A5}" type="datetimeFigureOut">
               <a:rPr lang="es-ES" smtClean="0"/>
-              <a:t>26/10/aa</a:t>
+              <a:t>29/10/aa</a:t>
             </a:fld>
             <a:endParaRPr lang="es-ES" dirty="0"/>
           </a:p>
@@ -1298,7 +1302,7 @@
           <a:p>
             <a:fld id="{E8895E6F-FE7D-47F3-BF3F-C434BE78B7A5}" type="datetimeFigureOut">
               <a:rPr lang="es-ES" smtClean="0"/>
-              <a:t>26/10/aa</a:t>
+              <a:t>29/10/aa</a:t>
             </a:fld>
             <a:endParaRPr lang="es-ES" dirty="0"/>
           </a:p>
@@ -1838,7 +1842,7 @@
           <a:p>
             <a:fld id="{E8895E6F-FE7D-47F3-BF3F-C434BE78B7A5}" type="datetimeFigureOut">
               <a:rPr lang="es-ES" smtClean="0"/>
-              <a:t>26/10/aa</a:t>
+              <a:t>29/10/aa</a:t>
             </a:fld>
             <a:endParaRPr lang="es-ES" dirty="0"/>
           </a:p>
@@ -2086,7 +2090,7 @@
           <a:p>
             <a:fld id="{E8895E6F-FE7D-47F3-BF3F-C434BE78B7A5}" type="datetimeFigureOut">
               <a:rPr lang="es-ES" smtClean="0"/>
-              <a:t>26/10/aa</a:t>
+              <a:t>29/10/aa</a:t>
             </a:fld>
             <a:endParaRPr lang="es-ES" dirty="0"/>
           </a:p>
@@ -2618,7 +2622,7 @@
           <a:p>
             <a:fld id="{E8895E6F-FE7D-47F3-BF3F-C434BE78B7A5}" type="datetimeFigureOut">
               <a:rPr lang="es-ES" smtClean="0"/>
-              <a:t>26/10/aa</a:t>
+              <a:t>29/10/aa</a:t>
             </a:fld>
             <a:endParaRPr lang="es-ES" dirty="0"/>
           </a:p>
@@ -2915,7 +2919,7 @@
           <a:p>
             <a:fld id="{E8895E6F-FE7D-47F3-BF3F-C434BE78B7A5}" type="datetimeFigureOut">
               <a:rPr lang="es-ES" smtClean="0"/>
-              <a:t>26/10/aa</a:t>
+              <a:t>29/10/aa</a:t>
             </a:fld>
             <a:endParaRPr lang="es-ES" dirty="0"/>
           </a:p>
@@ -3089,7 +3093,7 @@
           <a:p>
             <a:fld id="{E8895E6F-FE7D-47F3-BF3F-C434BE78B7A5}" type="datetimeFigureOut">
               <a:rPr lang="es-ES" smtClean="0"/>
-              <a:t>26/10/aa</a:t>
+              <a:t>29/10/aa</a:t>
             </a:fld>
             <a:endParaRPr lang="es-ES" dirty="0"/>
           </a:p>
@@ -3269,7 +3273,7 @@
           <a:p>
             <a:fld id="{E8895E6F-FE7D-47F3-BF3F-C434BE78B7A5}" type="datetimeFigureOut">
               <a:rPr lang="es-ES" smtClean="0"/>
-              <a:t>26/10/aa</a:t>
+              <a:t>29/10/aa</a:t>
             </a:fld>
             <a:endParaRPr lang="es-ES" dirty="0"/>
           </a:p>
@@ -3454,7 +3458,7 @@
           <a:p>
             <a:fld id="{E8895E6F-FE7D-47F3-BF3F-C434BE78B7A5}" type="datetimeFigureOut">
               <a:rPr lang="es-ES" smtClean="0"/>
-              <a:t>26/10/aa</a:t>
+              <a:t>29/10/aa</a:t>
             </a:fld>
             <a:endParaRPr lang="es-ES" dirty="0"/>
           </a:p>
@@ -3710,7 +3714,7 @@
           <a:p>
             <a:fld id="{E8895E6F-FE7D-47F3-BF3F-C434BE78B7A5}" type="datetimeFigureOut">
               <a:rPr lang="es-ES" smtClean="0"/>
-              <a:t>26/10/aa</a:t>
+              <a:t>29/10/aa</a:t>
             </a:fld>
             <a:endParaRPr lang="es-ES" dirty="0"/>
           </a:p>
@@ -4012,7 +4016,7 @@
           <a:p>
             <a:fld id="{E8895E6F-FE7D-47F3-BF3F-C434BE78B7A5}" type="datetimeFigureOut">
               <a:rPr lang="es-ES" smtClean="0"/>
-              <a:t>26/10/aa</a:t>
+              <a:t>29/10/aa</a:t>
             </a:fld>
             <a:endParaRPr lang="es-ES" dirty="0"/>
           </a:p>
@@ -4454,7 +4458,7 @@
           <a:p>
             <a:fld id="{E8895E6F-FE7D-47F3-BF3F-C434BE78B7A5}" type="datetimeFigureOut">
               <a:rPr lang="es-ES" smtClean="0"/>
-              <a:t>26/10/aa</a:t>
+              <a:t>29/10/aa</a:t>
             </a:fld>
             <a:endParaRPr lang="es-ES" dirty="0"/>
           </a:p>
@@ -4572,7 +4576,7 @@
           <a:p>
             <a:fld id="{E8895E6F-FE7D-47F3-BF3F-C434BE78B7A5}" type="datetimeFigureOut">
               <a:rPr lang="es-ES" smtClean="0"/>
-              <a:t>26/10/aa</a:t>
+              <a:t>29/10/aa</a:t>
             </a:fld>
             <a:endParaRPr lang="es-ES" dirty="0"/>
           </a:p>
@@ -4667,7 +4671,7 @@
           <a:p>
             <a:fld id="{E8895E6F-FE7D-47F3-BF3F-C434BE78B7A5}" type="datetimeFigureOut">
               <a:rPr lang="es-ES" smtClean="0"/>
-              <a:t>26/10/aa</a:t>
+              <a:t>29/10/aa</a:t>
             </a:fld>
             <a:endParaRPr lang="es-ES" dirty="0"/>
           </a:p>
@@ -4950,7 +4954,7 @@
           <a:p>
             <a:fld id="{E8895E6F-FE7D-47F3-BF3F-C434BE78B7A5}" type="datetimeFigureOut">
               <a:rPr lang="es-ES" smtClean="0"/>
-              <a:t>26/10/aa</a:t>
+              <a:t>29/10/aa</a:t>
             </a:fld>
             <a:endParaRPr lang="es-ES" dirty="0"/>
           </a:p>
@@ -5241,7 +5245,7 @@
           <a:p>
             <a:fld id="{E8895E6F-FE7D-47F3-BF3F-C434BE78B7A5}" type="datetimeFigureOut">
               <a:rPr lang="es-ES" smtClean="0"/>
-              <a:t>26/10/aa</a:t>
+              <a:t>29/10/aa</a:t>
             </a:fld>
             <a:endParaRPr lang="es-ES" dirty="0"/>
           </a:p>
@@ -5765,7 +5769,7 @@
           <a:p>
             <a:fld id="{E8895E6F-FE7D-47F3-BF3F-C434BE78B7A5}" type="datetimeFigureOut">
               <a:rPr lang="es-ES" smtClean="0"/>
-              <a:t>26/10/aa</a:t>
+              <a:t>29/10/aa</a:t>
             </a:fld>
             <a:endParaRPr lang="es-ES" dirty="0"/>
           </a:p>
@@ -6463,7 +6467,7 @@
       </p:sp>
       <p:pic>
         <p:nvPicPr>
-          <p:cNvPr id="4" name="Imagen 3"/>
+          <p:cNvPr id="5" name="Imagen 4"/>
           <p:cNvPicPr>
             <a:picLocks noChangeAspect="1"/>
           </p:cNvPicPr>
@@ -6483,8 +6487,8 @@
         </p:blipFill>
         <p:spPr>
           <a:xfrm>
-            <a:off x="600891" y="2151920"/>
-            <a:ext cx="7863840" cy="4205414"/>
+            <a:off x="365758" y="1914558"/>
+            <a:ext cx="8451669" cy="4760562"/>
           </a:xfrm>
           <a:prstGeom prst="rect">
             <a:avLst/>
@@ -6619,6 +6623,318 @@
           <a:bodyPr/>
           <a:lstStyle/>
           <a:p>
+            <a:endParaRPr lang="es-ES" dirty="0"/>
+          </a:p>
+        </p:txBody>
+      </p:sp>
+      <p:sp>
+        <p:nvSpPr>
+          <p:cNvPr id="3" name="Marcador de contenido 2"/>
+          <p:cNvSpPr>
+            <a:spLocks noGrp="1"/>
+          </p:cNvSpPr>
+          <p:nvPr>
+            <p:ph idx="1"/>
+          </p:nvPr>
+        </p:nvSpPr>
+        <p:spPr>
+          <a:xfrm>
+            <a:off x="982133" y="1502229"/>
+            <a:ext cx="7704667" cy="4497587"/>
+          </a:xfrm>
+        </p:spPr>
+        <p:txBody>
+          <a:bodyPr/>
+          <a:lstStyle/>
+          <a:p>
+            <a:endParaRPr lang="es-ES" dirty="0"/>
+          </a:p>
+        </p:txBody>
+      </p:sp>
+    </p:spTree>
+    <p:extLst>
+      <p:ext uri="{BB962C8B-B14F-4D97-AF65-F5344CB8AC3E}">
+        <p14:creationId xmlns:p14="http://schemas.microsoft.com/office/powerpoint/2010/main" val="2956545889"/>
+      </p:ext>
+    </p:extLst>
+  </p:cSld>
+  <p:clrMapOvr>
+    <a:masterClrMapping/>
+  </p:clrMapOvr>
+</p:sld>
+</file>
+
+<file path=ppt/slides/slide13.xml><?xml version="1.0" encoding="utf-8"?>
+<p:sld xmlns:a="http://schemas.openxmlformats.org/drawingml/2006/main" xmlns:r="http://schemas.openxmlformats.org/officeDocument/2006/relationships" xmlns:p="http://schemas.openxmlformats.org/presentationml/2006/main">
+  <p:cSld>
+    <p:spTree>
+      <p:nvGrpSpPr>
+        <p:cNvPr id="1" name=""/>
+        <p:cNvGrpSpPr/>
+        <p:nvPr/>
+      </p:nvGrpSpPr>
+      <p:grpSpPr>
+        <a:xfrm>
+          <a:off x="0" y="0"/>
+          <a:ext cx="0" cy="0"/>
+          <a:chOff x="0" y="0"/>
+          <a:chExt cx="0" cy="0"/>
+        </a:xfrm>
+      </p:grpSpPr>
+      <p:sp>
+        <p:nvSpPr>
+          <p:cNvPr id="2" name="Título 1"/>
+          <p:cNvSpPr>
+            <a:spLocks noGrp="1"/>
+          </p:cNvSpPr>
+          <p:nvPr>
+            <p:ph type="title"/>
+          </p:nvPr>
+        </p:nvSpPr>
+        <p:spPr>
+          <a:xfrm>
+            <a:off x="982133" y="156755"/>
+            <a:ext cx="7704667" cy="1240970"/>
+          </a:xfrm>
+        </p:spPr>
+        <p:txBody>
+          <a:bodyPr/>
+          <a:lstStyle/>
+          <a:p>
+            <a:endParaRPr lang="es-ES" dirty="0"/>
+          </a:p>
+        </p:txBody>
+      </p:sp>
+      <p:sp>
+        <p:nvSpPr>
+          <p:cNvPr id="3" name="Marcador de contenido 2"/>
+          <p:cNvSpPr>
+            <a:spLocks noGrp="1"/>
+          </p:cNvSpPr>
+          <p:nvPr>
+            <p:ph idx="1"/>
+          </p:nvPr>
+        </p:nvSpPr>
+        <p:spPr>
+          <a:xfrm>
+            <a:off x="982133" y="1502229"/>
+            <a:ext cx="7704667" cy="4497587"/>
+          </a:xfrm>
+        </p:spPr>
+        <p:txBody>
+          <a:bodyPr/>
+          <a:lstStyle/>
+          <a:p>
+            <a:endParaRPr lang="es-ES" dirty="0"/>
+          </a:p>
+        </p:txBody>
+      </p:sp>
+    </p:spTree>
+    <p:extLst>
+      <p:ext uri="{BB962C8B-B14F-4D97-AF65-F5344CB8AC3E}">
+        <p14:creationId xmlns:p14="http://schemas.microsoft.com/office/powerpoint/2010/main" val="313302241"/>
+      </p:ext>
+    </p:extLst>
+  </p:cSld>
+  <p:clrMapOvr>
+    <a:masterClrMapping/>
+  </p:clrMapOvr>
+</p:sld>
+</file>
+
+<file path=ppt/slides/slide14.xml><?xml version="1.0" encoding="utf-8"?>
+<p:sld xmlns:a="http://schemas.openxmlformats.org/drawingml/2006/main" xmlns:r="http://schemas.openxmlformats.org/officeDocument/2006/relationships" xmlns:p="http://schemas.openxmlformats.org/presentationml/2006/main">
+  <p:cSld>
+    <p:spTree>
+      <p:nvGrpSpPr>
+        <p:cNvPr id="1" name=""/>
+        <p:cNvGrpSpPr/>
+        <p:nvPr/>
+      </p:nvGrpSpPr>
+      <p:grpSpPr>
+        <a:xfrm>
+          <a:off x="0" y="0"/>
+          <a:ext cx="0" cy="0"/>
+          <a:chOff x="0" y="0"/>
+          <a:chExt cx="0" cy="0"/>
+        </a:xfrm>
+      </p:grpSpPr>
+      <p:sp>
+        <p:nvSpPr>
+          <p:cNvPr id="2" name="Título 1"/>
+          <p:cNvSpPr>
+            <a:spLocks noGrp="1"/>
+          </p:cNvSpPr>
+          <p:nvPr>
+            <p:ph type="title"/>
+          </p:nvPr>
+        </p:nvSpPr>
+        <p:spPr>
+          <a:xfrm>
+            <a:off x="982133" y="156755"/>
+            <a:ext cx="7704667" cy="1240970"/>
+          </a:xfrm>
+        </p:spPr>
+        <p:txBody>
+          <a:bodyPr/>
+          <a:lstStyle/>
+          <a:p>
+            <a:endParaRPr lang="es-ES" dirty="0"/>
+          </a:p>
+        </p:txBody>
+      </p:sp>
+      <p:sp>
+        <p:nvSpPr>
+          <p:cNvPr id="3" name="Marcador de contenido 2"/>
+          <p:cNvSpPr>
+            <a:spLocks noGrp="1"/>
+          </p:cNvSpPr>
+          <p:nvPr>
+            <p:ph idx="1"/>
+          </p:nvPr>
+        </p:nvSpPr>
+        <p:spPr>
+          <a:xfrm>
+            <a:off x="982133" y="1502229"/>
+            <a:ext cx="7704667" cy="4497587"/>
+          </a:xfrm>
+        </p:spPr>
+        <p:txBody>
+          <a:bodyPr/>
+          <a:lstStyle/>
+          <a:p>
+            <a:endParaRPr lang="es-ES" dirty="0"/>
+          </a:p>
+        </p:txBody>
+      </p:sp>
+    </p:spTree>
+    <p:extLst>
+      <p:ext uri="{BB962C8B-B14F-4D97-AF65-F5344CB8AC3E}">
+        <p14:creationId xmlns:p14="http://schemas.microsoft.com/office/powerpoint/2010/main" val="2582893392"/>
+      </p:ext>
+    </p:extLst>
+  </p:cSld>
+  <p:clrMapOvr>
+    <a:masterClrMapping/>
+  </p:clrMapOvr>
+</p:sld>
+</file>
+
+<file path=ppt/slides/slide15.xml><?xml version="1.0" encoding="utf-8"?>
+<p:sld xmlns:a="http://schemas.openxmlformats.org/drawingml/2006/main" xmlns:r="http://schemas.openxmlformats.org/officeDocument/2006/relationships" xmlns:p="http://schemas.openxmlformats.org/presentationml/2006/main">
+  <p:cSld>
+    <p:spTree>
+      <p:nvGrpSpPr>
+        <p:cNvPr id="1" name=""/>
+        <p:cNvGrpSpPr/>
+        <p:nvPr/>
+      </p:nvGrpSpPr>
+      <p:grpSpPr>
+        <a:xfrm>
+          <a:off x="0" y="0"/>
+          <a:ext cx="0" cy="0"/>
+          <a:chOff x="0" y="0"/>
+          <a:chExt cx="0" cy="0"/>
+        </a:xfrm>
+      </p:grpSpPr>
+      <p:sp>
+        <p:nvSpPr>
+          <p:cNvPr id="2" name="Título 1"/>
+          <p:cNvSpPr>
+            <a:spLocks noGrp="1"/>
+          </p:cNvSpPr>
+          <p:nvPr>
+            <p:ph type="title"/>
+          </p:nvPr>
+        </p:nvSpPr>
+        <p:spPr>
+          <a:xfrm>
+            <a:off x="982133" y="156755"/>
+            <a:ext cx="7704667" cy="1240970"/>
+          </a:xfrm>
+        </p:spPr>
+        <p:txBody>
+          <a:bodyPr/>
+          <a:lstStyle/>
+          <a:p>
+            <a:endParaRPr lang="es-ES" dirty="0"/>
+          </a:p>
+        </p:txBody>
+      </p:sp>
+      <p:sp>
+        <p:nvSpPr>
+          <p:cNvPr id="3" name="Marcador de contenido 2"/>
+          <p:cNvSpPr>
+            <a:spLocks noGrp="1"/>
+          </p:cNvSpPr>
+          <p:nvPr>
+            <p:ph idx="1"/>
+          </p:nvPr>
+        </p:nvSpPr>
+        <p:spPr>
+          <a:xfrm>
+            <a:off x="982133" y="1502229"/>
+            <a:ext cx="7704667" cy="4497587"/>
+          </a:xfrm>
+        </p:spPr>
+        <p:txBody>
+          <a:bodyPr/>
+          <a:lstStyle/>
+          <a:p>
+            <a:endParaRPr lang="es-ES" dirty="0"/>
+          </a:p>
+        </p:txBody>
+      </p:sp>
+    </p:spTree>
+    <p:extLst>
+      <p:ext uri="{BB962C8B-B14F-4D97-AF65-F5344CB8AC3E}">
+        <p14:creationId xmlns:p14="http://schemas.microsoft.com/office/powerpoint/2010/main" val="2109393785"/>
+      </p:ext>
+    </p:extLst>
+  </p:cSld>
+  <p:clrMapOvr>
+    <a:masterClrMapping/>
+  </p:clrMapOvr>
+</p:sld>
+</file>
+
+<file path=ppt/slides/slide16.xml><?xml version="1.0" encoding="utf-8"?>
+<p:sld xmlns:a="http://schemas.openxmlformats.org/drawingml/2006/main" xmlns:r="http://schemas.openxmlformats.org/officeDocument/2006/relationships" xmlns:p="http://schemas.openxmlformats.org/presentationml/2006/main">
+  <p:cSld>
+    <p:spTree>
+      <p:nvGrpSpPr>
+        <p:cNvPr id="1" name=""/>
+        <p:cNvGrpSpPr/>
+        <p:nvPr/>
+      </p:nvGrpSpPr>
+      <p:grpSpPr>
+        <a:xfrm>
+          <a:off x="0" y="0"/>
+          <a:ext cx="0" cy="0"/>
+          <a:chOff x="0" y="0"/>
+          <a:chExt cx="0" cy="0"/>
+        </a:xfrm>
+      </p:grpSpPr>
+      <p:sp>
+        <p:nvSpPr>
+          <p:cNvPr id="2" name="Título 1"/>
+          <p:cNvSpPr>
+            <a:spLocks noGrp="1"/>
+          </p:cNvSpPr>
+          <p:nvPr>
+            <p:ph type="title"/>
+          </p:nvPr>
+        </p:nvSpPr>
+        <p:spPr>
+          <a:xfrm>
+            <a:off x="982133" y="156755"/>
+            <a:ext cx="7704667" cy="1240970"/>
+          </a:xfrm>
+        </p:spPr>
+        <p:txBody>
+          <a:bodyPr/>
+          <a:lstStyle/>
+          <a:p>
             <a:r>
               <a:rPr lang="es-ES" dirty="0" smtClean="0"/>
               <a:t>Referencias</a:t>
@@ -6853,13 +7169,32 @@
           <a:p>
             <a:r>
               <a:rPr lang="es-ES" dirty="0" smtClean="0"/>
-              <a:t>3 Fijar una posición inicial y ayudar al usuario a situarse en la misma.</a:t>
-            </a:r>
-          </a:p>
-          <a:p>
+              <a:t>3 Fijar una posición inicial y ayudar al usuario a situarse en la misma</a:t>
+            </a:r>
             <a:r>
               <a:rPr lang="es-ES" dirty="0" smtClean="0"/>
-              <a:t>4 Establecer un margen de error que pueda ser modificable en la ejecución.</a:t>
+              <a:t>.</a:t>
+            </a:r>
+          </a:p>
+          <a:p>
+            <a:r>
+              <a:rPr lang="es-ES" dirty="0" smtClean="0"/>
+              <a:t>4 Ayudar al usuario mediante marcas virtuales para realizar acciones.</a:t>
+            </a:r>
+            <a:endParaRPr lang="es-ES" dirty="0" smtClean="0"/>
+          </a:p>
+          <a:p>
+            <a:r>
+              <a:rPr lang="es-ES" dirty="0"/>
+              <a:t>5</a:t>
+            </a:r>
+            <a:r>
+              <a:rPr lang="es-ES" dirty="0" smtClean="0"/>
+              <a:t> </a:t>
+            </a:r>
+            <a:r>
+              <a:rPr lang="es-ES" dirty="0" smtClean="0"/>
+              <a:t>Establecer un margen de error que pueda ser modificable en la ejecución.</a:t>
             </a:r>
             <a:endParaRPr lang="es-ES" dirty="0"/>
           </a:p>
@@ -7714,11 +8049,7 @@
           <a:p>
             <a:r>
               <a:rPr lang="es-ES" dirty="0" smtClean="0"/>
-              <a:t>Fijar Posición y ayudar al </a:t>
-            </a:r>
-            <a:r>
-              <a:rPr lang="es-ES" dirty="0" smtClean="0"/>
-              <a:t>usuario I</a:t>
+              <a:t>Fijar Posición y ayudar al usuario I</a:t>
             </a:r>
             <a:endParaRPr lang="es-ES" dirty="0"/>
           </a:p>
@@ -7766,7 +8097,6 @@
               <a:rPr lang="es-ES" dirty="0" smtClean="0"/>
               <a:t>” </a:t>
             </a:r>
-            <a:endParaRPr lang="es-ES" dirty="0" smtClean="0"/>
           </a:p>
           <a:p>
             <a:r>
@@ -7819,7 +8149,6 @@
               <a:rPr lang="es-ES" sz="1300" dirty="0" smtClean="0"/>
               <a:t>[5joints]</a:t>
             </a:r>
-            <a:endParaRPr lang="es-ES" sz="1300" dirty="0" smtClean="0"/>
           </a:p>
           <a:p>
             <a:endParaRPr lang="es-ES" dirty="0"/>

</xml_diff>

<commit_message>
Añadidos círculos rojo y verde
</commit_message>
<xml_diff>
--- a/Presentación Práctica 1.pptx
+++ b/Presentación Práctica 1.pptx
@@ -16,10 +16,10 @@
     <p:sldId id="265" r:id="rId10"/>
     <p:sldId id="266" r:id="rId11"/>
     <p:sldId id="267" r:id="rId12"/>
-    <p:sldId id="268" r:id="rId13"/>
-    <p:sldId id="269" r:id="rId14"/>
-    <p:sldId id="270" r:id="rId15"/>
-    <p:sldId id="271" r:id="rId16"/>
+    <p:sldId id="272" r:id="rId13"/>
+    <p:sldId id="273" r:id="rId14"/>
+    <p:sldId id="271" r:id="rId15"/>
+    <p:sldId id="274" r:id="rId16"/>
     <p:sldId id="261" r:id="rId17"/>
   </p:sldIdLst>
   <p:sldSz cx="9144000" cy="6858000" type="screen4x3"/>
@@ -744,7 +744,7 @@
           </a:ln>
           <a:extLst>
             <a:ext uri="{91240B29-F687-4f45-9708-019B960494DF}">
-              <a14:hiddenLine xmlns:a14="http://schemas.microsoft.com/office/drawing/2010/main" xmlns="" w="9525">
+              <a14:hiddenLine xmlns="" xmlns:a14="http://schemas.microsoft.com/office/drawing/2010/main" w="9525">
                 <a:solidFill>
                   <a:srgbClr val="000000"/>
                 </a:solidFill>
@@ -799,7 +799,7 @@
           </a:ln>
           <a:extLst>
             <a:ext uri="{91240B29-F687-4f45-9708-019B960494DF}">
-              <a14:hiddenLine xmlns:a14="http://schemas.microsoft.com/office/drawing/2010/main" xmlns="" w="9525">
+              <a14:hiddenLine xmlns="" xmlns:a14="http://schemas.microsoft.com/office/drawing/2010/main" w="9525">
                 <a:solidFill>
                   <a:srgbClr val="000000"/>
                 </a:solidFill>
@@ -6545,6 +6545,10 @@
           <a:bodyPr/>
           <a:lstStyle/>
           <a:p>
+            <a:r>
+              <a:rPr lang="es-ES" dirty="0" smtClean="0"/>
+              <a:t>Ayuda mediante marcas virtuales I</a:t>
+            </a:r>
             <a:endParaRPr lang="es-ES" dirty="0"/>
           </a:p>
         </p:txBody>
@@ -6569,6 +6573,22 @@
           <a:bodyPr/>
           <a:lstStyle/>
           <a:p>
+            <a:r>
+              <a:rPr lang="es-ES" dirty="0" smtClean="0"/>
+              <a:t>Para ayudar al usuario mediante marcas virtuales, vamos a usar círculos de colores. </a:t>
+            </a:r>
+          </a:p>
+          <a:p>
+            <a:r>
+              <a:rPr lang="es-ES" dirty="0" smtClean="0"/>
+              <a:t>Cuando el usuario se haya puesto en la distancia adecuada, aparecerá un círculo rojo para que suba la mano izquierda hasta el círculo. </a:t>
+            </a:r>
+          </a:p>
+          <a:p>
+            <a:r>
+              <a:rPr lang="es-ES" dirty="0" smtClean="0"/>
+              <a:t>En el momento que la suba, el círculo será verde.</a:t>
+            </a:r>
             <a:endParaRPr lang="es-ES" dirty="0"/>
           </a:p>
         </p:txBody>
@@ -6603,50 +6623,469 @@
           <a:chExt cx="0" cy="0"/>
         </a:xfrm>
       </p:grpSpPr>
-      <p:sp>
-        <p:nvSpPr>
-          <p:cNvPr id="2" name="Título 1"/>
-          <p:cNvSpPr>
-            <a:spLocks noGrp="1"/>
-          </p:cNvSpPr>
-          <p:nvPr>
-            <p:ph type="title"/>
-          </p:nvPr>
-        </p:nvSpPr>
+      <p:pic>
+        <p:nvPicPr>
+          <p:cNvPr id="4" name="Marcador de contenido 3"/>
+          <p:cNvPicPr>
+            <a:picLocks noGrp="1" noChangeAspect="1"/>
+          </p:cNvPicPr>
+          <p:nvPr>
+            <p:ph idx="1"/>
+          </p:nvPr>
+        </p:nvPicPr>
+        <p:blipFill>
+          <a:blip r:embed="rId2">
+            <a:extLst>
+              <a:ext uri="{28A0092B-C50C-407E-A947-70E740481C1C}">
+                <a14:useLocalDpi xmlns:a14="http://schemas.microsoft.com/office/drawing/2010/main" val="0"/>
+              </a:ext>
+            </a:extLst>
+          </a:blip>
+          <a:stretch>
+            <a:fillRect/>
+          </a:stretch>
+        </p:blipFill>
         <p:spPr>
           <a:xfrm>
-            <a:off x="982133" y="156755"/>
+            <a:off x="982133" y="2181497"/>
+            <a:ext cx="2474132" cy="4478494"/>
+          </a:xfrm>
+        </p:spPr>
+      </p:pic>
+      <p:pic>
+        <p:nvPicPr>
+          <p:cNvPr id="5" name="Imagen 4"/>
+          <p:cNvPicPr>
+            <a:picLocks noChangeAspect="1"/>
+          </p:cNvPicPr>
+          <p:nvPr/>
+        </p:nvPicPr>
+        <p:blipFill>
+          <a:blip r:embed="rId3">
+            <a:extLst>
+              <a:ext uri="{28A0092B-C50C-407E-A947-70E740481C1C}">
+                <a14:useLocalDpi xmlns:a14="http://schemas.microsoft.com/office/drawing/2010/main" val="0"/>
+              </a:ext>
+            </a:extLst>
+          </a:blip>
+          <a:stretch>
+            <a:fillRect/>
+          </a:stretch>
+        </p:blipFill>
+        <p:spPr>
+          <a:xfrm>
+            <a:off x="4222732" y="2181497"/>
+            <a:ext cx="1685239" cy="4483372"/>
+          </a:xfrm>
+          <a:prstGeom prst="rect">
+            <a:avLst/>
+          </a:prstGeom>
+        </p:spPr>
+      </p:pic>
+      <p:pic>
+        <p:nvPicPr>
+          <p:cNvPr id="6" name="Imagen 5"/>
+          <p:cNvPicPr>
+            <a:picLocks noChangeAspect="1"/>
+          </p:cNvPicPr>
+          <p:nvPr/>
+        </p:nvPicPr>
+        <p:blipFill>
+          <a:blip r:embed="rId4">
+            <a:extLst>
+              <a:ext uri="{28A0092B-C50C-407E-A947-70E740481C1C}">
+                <a14:useLocalDpi xmlns:a14="http://schemas.microsoft.com/office/drawing/2010/main" val="0"/>
+              </a:ext>
+            </a:extLst>
+          </a:blip>
+          <a:stretch>
+            <a:fillRect/>
+          </a:stretch>
+        </p:blipFill>
+        <p:spPr>
+          <a:xfrm>
+            <a:off x="6674439" y="2181497"/>
+            <a:ext cx="1711915" cy="4478494"/>
+          </a:xfrm>
+          <a:prstGeom prst="rect">
+            <a:avLst/>
+          </a:prstGeom>
+        </p:spPr>
+      </p:pic>
+      <p:sp>
+        <p:nvSpPr>
+          <p:cNvPr id="7" name="Título 1"/>
+          <p:cNvSpPr txBox="1">
+            <a:spLocks/>
+          </p:cNvSpPr>
+          <p:nvPr/>
+        </p:nvSpPr>
+        <p:spPr>
+          <a:xfrm>
+            <a:off x="1134533" y="309155"/>
             <a:ext cx="7704667" cy="1240970"/>
           </a:xfrm>
-        </p:spPr>
-        <p:txBody>
-          <a:bodyPr/>
-          <a:lstStyle/>
-          <a:p>
-            <a:endParaRPr lang="es-ES" dirty="0"/>
-          </a:p>
-        </p:txBody>
-      </p:sp>
-      <p:sp>
-        <p:nvSpPr>
-          <p:cNvPr id="3" name="Marcador de contenido 2"/>
-          <p:cNvSpPr>
-            <a:spLocks noGrp="1"/>
-          </p:cNvSpPr>
-          <p:nvPr>
-            <p:ph idx="1"/>
-          </p:nvPr>
+          <a:prstGeom prst="rect">
+            <a:avLst/>
+          </a:prstGeom>
+          <a:effectLst/>
+        </p:spPr>
+        <p:txBody>
+          <a:bodyPr vert="horz" lIns="91440" tIns="45720" rIns="91440" bIns="45720" rtlCol="0" anchor="ctr">
+            <a:normAutofit/>
+          </a:bodyPr>
+          <a:lstStyle>
+            <a:lvl1pPr algn="ctr" defTabSz="457200" rtl="0" eaLnBrk="1" latinLnBrk="0" hangingPunct="1">
+              <a:spcBef>
+                <a:spcPct val="0"/>
+              </a:spcBef>
+              <a:buNone/>
+              <a:defRPr sz="4000" kern="1200" cap="none">
+                <a:ln w="3175" cmpd="sng">
+                  <a:noFill/>
+                </a:ln>
+                <a:solidFill>
+                  <a:schemeClr val="tx1"/>
+                </a:solidFill>
+                <a:effectLst/>
+                <a:latin typeface="+mj-lt"/>
+                <a:ea typeface="+mj-ea"/>
+                <a:cs typeface="+mj-cs"/>
+              </a:defRPr>
+            </a:lvl1pPr>
+            <a:lvl2pPr eaLnBrk="1" hangingPunct="1">
+              <a:defRPr>
+                <a:solidFill>
+                  <a:schemeClr val="tx2"/>
+                </a:solidFill>
+              </a:defRPr>
+            </a:lvl2pPr>
+            <a:lvl3pPr eaLnBrk="1" hangingPunct="1">
+              <a:defRPr>
+                <a:solidFill>
+                  <a:schemeClr val="tx2"/>
+                </a:solidFill>
+              </a:defRPr>
+            </a:lvl3pPr>
+            <a:lvl4pPr eaLnBrk="1" hangingPunct="1">
+              <a:defRPr>
+                <a:solidFill>
+                  <a:schemeClr val="tx2"/>
+                </a:solidFill>
+              </a:defRPr>
+            </a:lvl4pPr>
+            <a:lvl5pPr eaLnBrk="1" hangingPunct="1">
+              <a:defRPr>
+                <a:solidFill>
+                  <a:schemeClr val="tx2"/>
+                </a:solidFill>
+              </a:defRPr>
+            </a:lvl5pPr>
+            <a:lvl6pPr eaLnBrk="1" hangingPunct="1">
+              <a:defRPr>
+                <a:solidFill>
+                  <a:schemeClr val="tx2"/>
+                </a:solidFill>
+              </a:defRPr>
+            </a:lvl6pPr>
+            <a:lvl7pPr eaLnBrk="1" hangingPunct="1">
+              <a:defRPr>
+                <a:solidFill>
+                  <a:schemeClr val="tx2"/>
+                </a:solidFill>
+              </a:defRPr>
+            </a:lvl7pPr>
+            <a:lvl8pPr eaLnBrk="1" hangingPunct="1">
+              <a:defRPr>
+                <a:solidFill>
+                  <a:schemeClr val="tx2"/>
+                </a:solidFill>
+              </a:defRPr>
+            </a:lvl8pPr>
+            <a:lvl9pPr eaLnBrk="1" hangingPunct="1">
+              <a:defRPr>
+                <a:solidFill>
+                  <a:schemeClr val="tx2"/>
+                </a:solidFill>
+              </a:defRPr>
+            </a:lvl9pPr>
+          </a:lstStyle>
+          <a:p>
+            <a:r>
+              <a:rPr lang="es-ES" smtClean="0"/>
+              <a:t>Ayuda mediante marcas virtuales II</a:t>
+            </a:r>
+            <a:endParaRPr lang="es-ES" dirty="0"/>
+          </a:p>
+        </p:txBody>
+      </p:sp>
+      <p:sp>
+        <p:nvSpPr>
+          <p:cNvPr id="9" name="Marcador de contenido 2"/>
+          <p:cNvSpPr txBox="1">
+            <a:spLocks/>
+          </p:cNvSpPr>
+          <p:nvPr/>
         </p:nvSpPr>
         <p:spPr>
           <a:xfrm>
-            <a:off x="982133" y="1502229"/>
-            <a:ext cx="7704667" cy="4497587"/>
-          </a:xfrm>
-        </p:spPr>
-        <p:txBody>
-          <a:bodyPr/>
-          <a:lstStyle/>
-          <a:p>
+            <a:off x="681687" y="1550125"/>
+            <a:ext cx="7704667" cy="2521131"/>
+          </a:xfrm>
+          <a:prstGeom prst="rect">
+            <a:avLst/>
+          </a:prstGeom>
+        </p:spPr>
+        <p:txBody>
+          <a:bodyPr vert="horz" lIns="91440" tIns="45720" rIns="91440" bIns="45720" rtlCol="0" anchor="ctr">
+            <a:normAutofit/>
+          </a:bodyPr>
+          <a:lstStyle>
+            <a:lvl1pPr marL="285750" indent="-285750" algn="l" defTabSz="457200" rtl="0" eaLnBrk="1" latinLnBrk="0" hangingPunct="1">
+              <a:spcBef>
+                <a:spcPct val="20000"/>
+              </a:spcBef>
+              <a:spcAft>
+                <a:spcPts val="600"/>
+              </a:spcAft>
+              <a:buClr>
+                <a:schemeClr val="accent1">
+                  <a:lumMod val="75000"/>
+                </a:schemeClr>
+              </a:buClr>
+              <a:buSzPct val="145000"/>
+              <a:buFont typeface="Arial"/>
+              <a:buChar char="•"/>
+              <a:defRPr sz="2400" kern="1200" cap="none">
+                <a:solidFill>
+                  <a:schemeClr val="tx1"/>
+                </a:solidFill>
+                <a:effectLst/>
+                <a:latin typeface="+mn-lt"/>
+                <a:ea typeface="+mn-ea"/>
+                <a:cs typeface="+mn-cs"/>
+              </a:defRPr>
+            </a:lvl1pPr>
+            <a:lvl2pPr marL="742950" indent="-285750" algn="l" defTabSz="457200" rtl="0" eaLnBrk="1" latinLnBrk="0" hangingPunct="1">
+              <a:spcBef>
+                <a:spcPct val="20000"/>
+              </a:spcBef>
+              <a:spcAft>
+                <a:spcPts val="600"/>
+              </a:spcAft>
+              <a:buClr>
+                <a:schemeClr val="accent1">
+                  <a:lumMod val="75000"/>
+                </a:schemeClr>
+              </a:buClr>
+              <a:buSzPct val="145000"/>
+              <a:buFont typeface="Arial"/>
+              <a:buChar char="•"/>
+              <a:defRPr sz="2000" kern="1200" cap="none">
+                <a:solidFill>
+                  <a:schemeClr val="tx1"/>
+                </a:solidFill>
+                <a:effectLst/>
+                <a:latin typeface="+mn-lt"/>
+                <a:ea typeface="+mn-ea"/>
+                <a:cs typeface="+mn-cs"/>
+              </a:defRPr>
+            </a:lvl2pPr>
+            <a:lvl3pPr marL="1200150" indent="-285750" algn="l" defTabSz="457200" rtl="0" eaLnBrk="1" latinLnBrk="0" hangingPunct="1">
+              <a:spcBef>
+                <a:spcPct val="20000"/>
+              </a:spcBef>
+              <a:spcAft>
+                <a:spcPts val="600"/>
+              </a:spcAft>
+              <a:buClr>
+                <a:schemeClr val="accent1">
+                  <a:lumMod val="75000"/>
+                </a:schemeClr>
+              </a:buClr>
+              <a:buSzPct val="145000"/>
+              <a:buFont typeface="Arial"/>
+              <a:buChar char="•"/>
+              <a:defRPr sz="1800" kern="1200" cap="none">
+                <a:solidFill>
+                  <a:schemeClr val="tx1"/>
+                </a:solidFill>
+                <a:effectLst/>
+                <a:latin typeface="+mn-lt"/>
+                <a:ea typeface="+mn-ea"/>
+                <a:cs typeface="+mn-cs"/>
+              </a:defRPr>
+            </a:lvl3pPr>
+            <a:lvl4pPr marL="1543050" indent="-171450" algn="l" defTabSz="457200" rtl="0" eaLnBrk="1" latinLnBrk="0" hangingPunct="1">
+              <a:spcBef>
+                <a:spcPct val="20000"/>
+              </a:spcBef>
+              <a:spcAft>
+                <a:spcPts val="600"/>
+              </a:spcAft>
+              <a:buClr>
+                <a:schemeClr val="accent1">
+                  <a:lumMod val="75000"/>
+                </a:schemeClr>
+              </a:buClr>
+              <a:buSzPct val="145000"/>
+              <a:buFont typeface="Arial"/>
+              <a:buChar char="•"/>
+              <a:defRPr sz="1600" kern="1200" cap="none">
+                <a:solidFill>
+                  <a:schemeClr val="tx1"/>
+                </a:solidFill>
+                <a:effectLst/>
+                <a:latin typeface="+mn-lt"/>
+                <a:ea typeface="+mn-ea"/>
+                <a:cs typeface="+mn-cs"/>
+              </a:defRPr>
+            </a:lvl4pPr>
+            <a:lvl5pPr marL="2000250" indent="-171450" algn="l" defTabSz="457200" rtl="0" eaLnBrk="1" latinLnBrk="0" hangingPunct="1">
+              <a:spcBef>
+                <a:spcPct val="20000"/>
+              </a:spcBef>
+              <a:spcAft>
+                <a:spcPts val="600"/>
+              </a:spcAft>
+              <a:buClr>
+                <a:schemeClr val="accent1">
+                  <a:lumMod val="75000"/>
+                </a:schemeClr>
+              </a:buClr>
+              <a:buSzPct val="145000"/>
+              <a:buFont typeface="Arial"/>
+              <a:buChar char="•"/>
+              <a:defRPr sz="1400" kern="1200" cap="none">
+                <a:solidFill>
+                  <a:schemeClr val="tx1"/>
+                </a:solidFill>
+                <a:effectLst/>
+                <a:latin typeface="+mn-lt"/>
+                <a:ea typeface="+mn-ea"/>
+                <a:cs typeface="+mn-cs"/>
+              </a:defRPr>
+            </a:lvl5pPr>
+            <a:lvl6pPr marL="2514600" indent="-228600" algn="l" defTabSz="457200" rtl="0" eaLnBrk="1" latinLnBrk="0" hangingPunct="1">
+              <a:spcBef>
+                <a:spcPct val="20000"/>
+              </a:spcBef>
+              <a:spcAft>
+                <a:spcPts val="600"/>
+              </a:spcAft>
+              <a:buClr>
+                <a:schemeClr val="accent1">
+                  <a:lumMod val="75000"/>
+                </a:schemeClr>
+              </a:buClr>
+              <a:buSzPct val="145000"/>
+              <a:buFont typeface="Arial"/>
+              <a:buChar char="•"/>
+              <a:defRPr sz="1400" kern="1200" cap="none">
+                <a:solidFill>
+                  <a:schemeClr val="tx1"/>
+                </a:solidFill>
+                <a:effectLst/>
+                <a:latin typeface="+mn-lt"/>
+                <a:ea typeface="+mn-ea"/>
+                <a:cs typeface="+mn-cs"/>
+              </a:defRPr>
+            </a:lvl6pPr>
+            <a:lvl7pPr marL="2971800" indent="-228600" algn="l" defTabSz="457200" rtl="0" eaLnBrk="1" latinLnBrk="0" hangingPunct="1">
+              <a:spcBef>
+                <a:spcPct val="20000"/>
+              </a:spcBef>
+              <a:spcAft>
+                <a:spcPts val="600"/>
+              </a:spcAft>
+              <a:buClr>
+                <a:schemeClr val="accent1">
+                  <a:lumMod val="75000"/>
+                </a:schemeClr>
+              </a:buClr>
+              <a:buSzPct val="145000"/>
+              <a:buFont typeface="Arial"/>
+              <a:buChar char="•"/>
+              <a:defRPr sz="1400" kern="1200" cap="none">
+                <a:solidFill>
+                  <a:schemeClr val="tx1"/>
+                </a:solidFill>
+                <a:effectLst/>
+                <a:latin typeface="+mn-lt"/>
+                <a:ea typeface="+mn-ea"/>
+                <a:cs typeface="+mn-cs"/>
+              </a:defRPr>
+            </a:lvl7pPr>
+            <a:lvl8pPr marL="3429000" indent="-228600" algn="l" defTabSz="457200" rtl="0" eaLnBrk="1" latinLnBrk="0" hangingPunct="1">
+              <a:spcBef>
+                <a:spcPct val="20000"/>
+              </a:spcBef>
+              <a:spcAft>
+                <a:spcPts val="600"/>
+              </a:spcAft>
+              <a:buClr>
+                <a:schemeClr val="accent1">
+                  <a:lumMod val="75000"/>
+                </a:schemeClr>
+              </a:buClr>
+              <a:buSzPct val="145000"/>
+              <a:buFont typeface="Arial"/>
+              <a:buChar char="•"/>
+              <a:defRPr sz="1400" kern="1200" cap="none">
+                <a:solidFill>
+                  <a:schemeClr val="tx1"/>
+                </a:solidFill>
+                <a:effectLst/>
+                <a:latin typeface="+mn-lt"/>
+                <a:ea typeface="+mn-ea"/>
+                <a:cs typeface="+mn-cs"/>
+              </a:defRPr>
+            </a:lvl8pPr>
+            <a:lvl9pPr marL="3886200" indent="-228600" algn="l" defTabSz="457200" rtl="0" eaLnBrk="1" latinLnBrk="0" hangingPunct="1">
+              <a:spcBef>
+                <a:spcPct val="20000"/>
+              </a:spcBef>
+              <a:spcAft>
+                <a:spcPts val="600"/>
+              </a:spcAft>
+              <a:buClr>
+                <a:schemeClr val="accent1">
+                  <a:lumMod val="75000"/>
+                </a:schemeClr>
+              </a:buClr>
+              <a:buSzPct val="145000"/>
+              <a:buFont typeface="Arial"/>
+              <a:buChar char="•"/>
+              <a:defRPr sz="1400" kern="1200" cap="none">
+                <a:solidFill>
+                  <a:schemeClr val="tx1"/>
+                </a:solidFill>
+                <a:effectLst/>
+                <a:latin typeface="+mn-lt"/>
+                <a:ea typeface="+mn-ea"/>
+                <a:cs typeface="+mn-cs"/>
+              </a:defRPr>
+            </a:lvl9pPr>
+          </a:lstStyle>
+          <a:p>
+            <a:r>
+              <a:rPr lang="es-ES" dirty="0" smtClean="0"/>
+              <a:t>Podemos observar su funcionamiento:</a:t>
+            </a:r>
+          </a:p>
+          <a:p>
+            <a:endParaRPr lang="es-ES" dirty="0"/>
+          </a:p>
+          <a:p>
+            <a:endParaRPr lang="es-ES" dirty="0" smtClean="0"/>
+          </a:p>
+          <a:p>
+            <a:endParaRPr lang="es-ES" dirty="0"/>
+          </a:p>
+          <a:p>
+            <a:pPr marL="0" indent="0">
+              <a:buNone/>
+            </a:pPr>
             <a:endParaRPr lang="es-ES" dirty="0"/>
           </a:p>
         </p:txBody>
@@ -6654,7 +7093,7 @@
     </p:spTree>
     <p:extLst>
       <p:ext uri="{BB962C8B-B14F-4D97-AF65-F5344CB8AC3E}">
-        <p14:creationId xmlns:p14="http://schemas.microsoft.com/office/powerpoint/2010/main" val="2956545889"/>
+        <p14:creationId xmlns:p14="http://schemas.microsoft.com/office/powerpoint/2010/main" val="177183986"/>
       </p:ext>
     </p:extLst>
   </p:cSld>
@@ -6701,6 +7140,10 @@
           <a:bodyPr/>
           <a:lstStyle/>
           <a:p>
+            <a:r>
+              <a:rPr lang="es-ES" dirty="0" smtClean="0"/>
+              <a:t>Ayuda mediante marcas virtuales</a:t>
+            </a:r>
             <a:endParaRPr lang="es-ES" dirty="0"/>
           </a:p>
         </p:txBody>
@@ -6732,7 +7175,7 @@
     </p:spTree>
     <p:extLst>
       <p:ext uri="{BB962C8B-B14F-4D97-AF65-F5344CB8AC3E}">
-        <p14:creationId xmlns:p14="http://schemas.microsoft.com/office/powerpoint/2010/main" val="313302241"/>
+        <p14:creationId xmlns:p14="http://schemas.microsoft.com/office/powerpoint/2010/main" val="312554372"/>
       </p:ext>
     </p:extLst>
   </p:cSld>
@@ -6810,7 +7253,7 @@
     </p:spTree>
     <p:extLst>
       <p:ext uri="{BB962C8B-B14F-4D97-AF65-F5344CB8AC3E}">
-        <p14:creationId xmlns:p14="http://schemas.microsoft.com/office/powerpoint/2010/main" val="2582893392"/>
+        <p14:creationId xmlns:p14="http://schemas.microsoft.com/office/powerpoint/2010/main" val="2109393785"/>
       </p:ext>
     </p:extLst>
   </p:cSld>
@@ -6857,6 +7300,10 @@
           <a:bodyPr/>
           <a:lstStyle/>
           <a:p>
+            <a:r>
+              <a:rPr lang="es-ES" dirty="0" smtClean="0"/>
+              <a:t>Problemas presentados</a:t>
+            </a:r>
             <a:endParaRPr lang="es-ES" dirty="0"/>
           </a:p>
         </p:txBody>
@@ -6888,7 +7335,7 @@
     </p:spTree>
     <p:extLst>
       <p:ext uri="{BB962C8B-B14F-4D97-AF65-F5344CB8AC3E}">
-        <p14:creationId xmlns:p14="http://schemas.microsoft.com/office/powerpoint/2010/main" val="2109393785"/>
+        <p14:creationId xmlns:p14="http://schemas.microsoft.com/office/powerpoint/2010/main" val="142755937"/>
       </p:ext>
     </p:extLst>
   </p:cSld>
@@ -7169,11 +7616,7 @@
           <a:p>
             <a:r>
               <a:rPr lang="es-ES" dirty="0" smtClean="0"/>
-              <a:t>3 Fijar una posición inicial y ayudar al usuario a situarse en la misma</a:t>
-            </a:r>
-            <a:r>
-              <a:rPr lang="es-ES" dirty="0" smtClean="0"/>
-              <a:t>.</a:t>
+              <a:t>3 Fijar una posición inicial y ayudar al usuario a situarse en la misma.</a:t>
             </a:r>
           </a:p>
           <a:p>
@@ -7181,7 +7624,6 @@
               <a:rPr lang="es-ES" dirty="0" smtClean="0"/>
               <a:t>4 Ayudar al usuario mediante marcas virtuales para realizar acciones.</a:t>
             </a:r>
-            <a:endParaRPr lang="es-ES" dirty="0" smtClean="0"/>
           </a:p>
           <a:p>
             <a:r>
@@ -7190,11 +7632,7 @@
             </a:r>
             <a:r>
               <a:rPr lang="es-ES" dirty="0" smtClean="0"/>
-              <a:t> </a:t>
-            </a:r>
-            <a:r>
-              <a:rPr lang="es-ES" dirty="0" smtClean="0"/>
-              <a:t>Establecer un margen de error que pueda ser modificable en la ejecución.</a:t>
+              <a:t> Establecer un margen de error que pueda ser modificable en la ejecución.</a:t>
             </a:r>
             <a:endParaRPr lang="es-ES" dirty="0"/>
           </a:p>

</xml_diff>

<commit_message>
Añadidas flechas izquierda y derecha
</commit_message>
<xml_diff>
--- a/Presentación Práctica 1.pptx
+++ b/Presentación Práctica 1.pptx
@@ -744,7 +744,7 @@
           </a:ln>
           <a:extLst>
             <a:ext uri="{91240B29-F687-4f45-9708-019B960494DF}">
-              <a14:hiddenLine xmlns="" xmlns:a14="http://schemas.microsoft.com/office/drawing/2010/main" w="9525">
+              <a14:hiddenLine xmlns:a14="http://schemas.microsoft.com/office/drawing/2010/main" xmlns="" w="9525">
                 <a:solidFill>
                   <a:srgbClr val="000000"/>
                 </a:solidFill>
@@ -799,7 +799,7 @@
           </a:ln>
           <a:extLst>
             <a:ext uri="{91240B29-F687-4f45-9708-019B960494DF}">
-              <a14:hiddenLine xmlns="" xmlns:a14="http://schemas.microsoft.com/office/drawing/2010/main" w="9525">
+              <a14:hiddenLine xmlns:a14="http://schemas.microsoft.com/office/drawing/2010/main" xmlns="" w="9525">
                 <a:solidFill>
                   <a:srgbClr val="000000"/>
                 </a:solidFill>
@@ -7142,7 +7142,11 @@
           <a:p>
             <a:r>
               <a:rPr lang="es-ES" dirty="0" smtClean="0"/>
-              <a:t>Ayuda mediante marcas virtuales</a:t>
+              <a:t>Ayuda mediante marcas </a:t>
+            </a:r>
+            <a:r>
+              <a:rPr lang="es-ES" dirty="0" smtClean="0"/>
+              <a:t>virtuales III</a:t>
             </a:r>
             <a:endParaRPr lang="es-ES" dirty="0"/>
           </a:p>
@@ -7168,10 +7172,61 @@
           <a:bodyPr/>
           <a:lstStyle/>
           <a:p>
-            <a:endParaRPr lang="es-ES" dirty="0"/>
-          </a:p>
-        </p:txBody>
-      </p:sp>
+            <a:r>
+              <a:rPr lang="es-ES" dirty="0" smtClean="0"/>
+              <a:t>Otra ayuda propuesta para el usuario es el uso de flechas indicando que se tiene que mover a la izquierda o derecha, ya que es mucho más intuitivo que estar leyendo.</a:t>
+            </a:r>
+          </a:p>
+          <a:p>
+            <a:endParaRPr lang="es-ES" dirty="0"/>
+          </a:p>
+          <a:p>
+            <a:endParaRPr lang="es-ES" dirty="0" smtClean="0"/>
+          </a:p>
+          <a:p>
+            <a:endParaRPr lang="es-ES" dirty="0"/>
+          </a:p>
+          <a:p>
+            <a:endParaRPr lang="es-ES" dirty="0" smtClean="0"/>
+          </a:p>
+          <a:p>
+            <a:endParaRPr lang="es-ES" dirty="0"/>
+          </a:p>
+          <a:p>
+            <a:endParaRPr lang="es-ES" dirty="0"/>
+          </a:p>
+        </p:txBody>
+      </p:sp>
+      <p:pic>
+        <p:nvPicPr>
+          <p:cNvPr id="4" name="Imagen 3"/>
+          <p:cNvPicPr>
+            <a:picLocks noChangeAspect="1"/>
+          </p:cNvPicPr>
+          <p:nvPr/>
+        </p:nvPicPr>
+        <p:blipFill>
+          <a:blip r:embed="rId2">
+            <a:extLst>
+              <a:ext uri="{28A0092B-C50C-407E-A947-70E740481C1C}">
+                <a14:useLocalDpi xmlns:a14="http://schemas.microsoft.com/office/drawing/2010/main" val="0"/>
+              </a:ext>
+            </a:extLst>
+          </a:blip>
+          <a:stretch>
+            <a:fillRect/>
+          </a:stretch>
+        </p:blipFill>
+        <p:spPr>
+          <a:xfrm>
+            <a:off x="2612571" y="2924850"/>
+            <a:ext cx="5904411" cy="3276031"/>
+          </a:xfrm>
+          <a:prstGeom prst="rect">
+            <a:avLst/>
+          </a:prstGeom>
+        </p:spPr>
+      </p:pic>
     </p:spTree>
     <p:extLst>
       <p:ext uri="{BB962C8B-B14F-4D97-AF65-F5344CB8AC3E}">

</xml_diff>

<commit_message>
Añadidos presentación y tutorial
</commit_message>
<xml_diff>
--- a/Presentación Práctica 1.pptx
+++ b/Presentación Práctica 1.pptx
@@ -643,7 +643,7 @@
           <a:p>
             <a:fld id="{E8895E6F-FE7D-47F3-BF3F-C434BE78B7A5}" type="datetimeFigureOut">
               <a:rPr lang="es-ES" smtClean="0"/>
-              <a:t>29/10/aa</a:t>
+              <a:t>30/10/15</a:t>
             </a:fld>
             <a:endParaRPr lang="es-ES" dirty="0"/>
           </a:p>
@@ -695,7 +695,7 @@
           <a:p>
             <a:fld id="{64B06C07-F37A-4A03-A4E0-24643B0A2624}" type="slidenum">
               <a:rPr lang="es-ES" smtClean="0"/>
-              <a:t>‹Nº›</a:t>
+              <a:t>‹Nr.›</a:t>
             </a:fld>
             <a:endParaRPr lang="es-ES" dirty="0"/>
           </a:p>
@@ -1054,7 +1054,7 @@
           <a:p>
             <a:fld id="{E8895E6F-FE7D-47F3-BF3F-C434BE78B7A5}" type="datetimeFigureOut">
               <a:rPr lang="es-ES" smtClean="0"/>
-              <a:t>29/10/aa</a:t>
+              <a:t>30/10/15</a:t>
             </a:fld>
             <a:endParaRPr lang="es-ES" dirty="0"/>
           </a:p>
@@ -1096,7 +1096,7 @@
           <a:p>
             <a:fld id="{64B06C07-F37A-4A03-A4E0-24643B0A2624}" type="slidenum">
               <a:rPr lang="es-ES" smtClean="0"/>
-              <a:t>‹Nº›</a:t>
+              <a:t>‹Nr.›</a:t>
             </a:fld>
             <a:endParaRPr lang="es-ES" dirty="0"/>
           </a:p>
@@ -1302,7 +1302,7 @@
           <a:p>
             <a:fld id="{E8895E6F-FE7D-47F3-BF3F-C434BE78B7A5}" type="datetimeFigureOut">
               <a:rPr lang="es-ES" smtClean="0"/>
-              <a:t>29/10/aa</a:t>
+              <a:t>30/10/15</a:t>
             </a:fld>
             <a:endParaRPr lang="es-ES" dirty="0"/>
           </a:p>
@@ -1344,7 +1344,7 @@
           <a:p>
             <a:fld id="{64B06C07-F37A-4A03-A4E0-24643B0A2624}" type="slidenum">
               <a:rPr lang="es-ES" smtClean="0"/>
-              <a:t>‹Nº›</a:t>
+              <a:t>‹Nr.›</a:t>
             </a:fld>
             <a:endParaRPr lang="es-ES" dirty="0"/>
           </a:p>
@@ -1842,7 +1842,7 @@
           <a:p>
             <a:fld id="{E8895E6F-FE7D-47F3-BF3F-C434BE78B7A5}" type="datetimeFigureOut">
               <a:rPr lang="es-ES" smtClean="0"/>
-              <a:t>29/10/aa</a:t>
+              <a:t>30/10/15</a:t>
             </a:fld>
             <a:endParaRPr lang="es-ES" dirty="0"/>
           </a:p>
@@ -1884,7 +1884,7 @@
           <a:p>
             <a:fld id="{64B06C07-F37A-4A03-A4E0-24643B0A2624}" type="slidenum">
               <a:rPr lang="es-ES" smtClean="0"/>
-              <a:t>‹Nº›</a:t>
+              <a:t>‹Nr.›</a:t>
             </a:fld>
             <a:endParaRPr lang="es-ES" dirty="0"/>
           </a:p>
@@ -2090,7 +2090,7 @@
           <a:p>
             <a:fld id="{E8895E6F-FE7D-47F3-BF3F-C434BE78B7A5}" type="datetimeFigureOut">
               <a:rPr lang="es-ES" smtClean="0"/>
-              <a:t>29/10/aa</a:t>
+              <a:t>30/10/15</a:t>
             </a:fld>
             <a:endParaRPr lang="es-ES" dirty="0"/>
           </a:p>
@@ -2132,7 +2132,7 @@
           <a:p>
             <a:fld id="{64B06C07-F37A-4A03-A4E0-24643B0A2624}" type="slidenum">
               <a:rPr lang="es-ES" smtClean="0"/>
-              <a:t>‹Nº›</a:t>
+              <a:t>‹Nr.›</a:t>
             </a:fld>
             <a:endParaRPr lang="es-ES" dirty="0"/>
           </a:p>
@@ -2622,7 +2622,7 @@
           <a:p>
             <a:fld id="{E8895E6F-FE7D-47F3-BF3F-C434BE78B7A5}" type="datetimeFigureOut">
               <a:rPr lang="es-ES" smtClean="0"/>
-              <a:t>29/10/aa</a:t>
+              <a:t>30/10/15</a:t>
             </a:fld>
             <a:endParaRPr lang="es-ES" dirty="0"/>
           </a:p>
@@ -2664,7 +2664,7 @@
           <a:p>
             <a:fld id="{64B06C07-F37A-4A03-A4E0-24643B0A2624}" type="slidenum">
               <a:rPr lang="es-ES" smtClean="0"/>
-              <a:t>‹Nº›</a:t>
+              <a:t>‹Nr.›</a:t>
             </a:fld>
             <a:endParaRPr lang="es-ES" dirty="0"/>
           </a:p>
@@ -2919,7 +2919,7 @@
           <a:p>
             <a:fld id="{E8895E6F-FE7D-47F3-BF3F-C434BE78B7A5}" type="datetimeFigureOut">
               <a:rPr lang="es-ES" smtClean="0"/>
-              <a:t>29/10/aa</a:t>
+              <a:t>30/10/15</a:t>
             </a:fld>
             <a:endParaRPr lang="es-ES" dirty="0"/>
           </a:p>
@@ -2961,7 +2961,7 @@
           <a:p>
             <a:fld id="{64B06C07-F37A-4A03-A4E0-24643B0A2624}" type="slidenum">
               <a:rPr lang="es-ES" smtClean="0"/>
-              <a:t>‹Nº›</a:t>
+              <a:t>‹Nr.›</a:t>
             </a:fld>
             <a:endParaRPr lang="es-ES" dirty="0"/>
           </a:p>
@@ -3093,7 +3093,7 @@
           <a:p>
             <a:fld id="{E8895E6F-FE7D-47F3-BF3F-C434BE78B7A5}" type="datetimeFigureOut">
               <a:rPr lang="es-ES" smtClean="0"/>
-              <a:t>29/10/aa</a:t>
+              <a:t>30/10/15</a:t>
             </a:fld>
             <a:endParaRPr lang="es-ES" dirty="0"/>
           </a:p>
@@ -3135,7 +3135,7 @@
           <a:p>
             <a:fld id="{64B06C07-F37A-4A03-A4E0-24643B0A2624}" type="slidenum">
               <a:rPr lang="es-ES" smtClean="0"/>
-              <a:t>‹Nº›</a:t>
+              <a:t>‹Nr.›</a:t>
             </a:fld>
             <a:endParaRPr lang="es-ES" dirty="0"/>
           </a:p>
@@ -3273,7 +3273,7 @@
           <a:p>
             <a:fld id="{E8895E6F-FE7D-47F3-BF3F-C434BE78B7A5}" type="datetimeFigureOut">
               <a:rPr lang="es-ES" smtClean="0"/>
-              <a:t>29/10/aa</a:t>
+              <a:t>30/10/15</a:t>
             </a:fld>
             <a:endParaRPr lang="es-ES" dirty="0"/>
           </a:p>
@@ -3315,7 +3315,7 @@
           <a:p>
             <a:fld id="{64B06C07-F37A-4A03-A4E0-24643B0A2624}" type="slidenum">
               <a:rPr lang="es-ES" smtClean="0"/>
-              <a:t>‹Nº›</a:t>
+              <a:t>‹Nr.›</a:t>
             </a:fld>
             <a:endParaRPr lang="es-ES" dirty="0"/>
           </a:p>
@@ -3458,7 +3458,7 @@
           <a:p>
             <a:fld id="{E8895E6F-FE7D-47F3-BF3F-C434BE78B7A5}" type="datetimeFigureOut">
               <a:rPr lang="es-ES" smtClean="0"/>
-              <a:t>29/10/aa</a:t>
+              <a:t>30/10/15</a:t>
             </a:fld>
             <a:endParaRPr lang="es-ES" dirty="0"/>
           </a:p>
@@ -3510,7 +3510,7 @@
           <a:p>
             <a:fld id="{64B06C07-F37A-4A03-A4E0-24643B0A2624}" type="slidenum">
               <a:rPr lang="es-ES" smtClean="0"/>
-              <a:t>‹Nº›</a:t>
+              <a:t>‹Nr.›</a:t>
             </a:fld>
             <a:endParaRPr lang="es-ES" dirty="0"/>
           </a:p>
@@ -3714,7 +3714,7 @@
           <a:p>
             <a:fld id="{E8895E6F-FE7D-47F3-BF3F-C434BE78B7A5}" type="datetimeFigureOut">
               <a:rPr lang="es-ES" smtClean="0"/>
-              <a:t>29/10/aa</a:t>
+              <a:t>30/10/15</a:t>
             </a:fld>
             <a:endParaRPr lang="es-ES" dirty="0"/>
           </a:p>
@@ -3761,7 +3761,7 @@
           <a:p>
             <a:fld id="{64B06C07-F37A-4A03-A4E0-24643B0A2624}" type="slidenum">
               <a:rPr lang="es-ES" smtClean="0"/>
-              <a:t>‹Nº›</a:t>
+              <a:t>‹Nr.›</a:t>
             </a:fld>
             <a:endParaRPr lang="es-ES" dirty="0"/>
           </a:p>
@@ -4016,7 +4016,7 @@
           <a:p>
             <a:fld id="{E8895E6F-FE7D-47F3-BF3F-C434BE78B7A5}" type="datetimeFigureOut">
               <a:rPr lang="es-ES" smtClean="0"/>
-              <a:t>29/10/aa</a:t>
+              <a:t>30/10/15</a:t>
             </a:fld>
             <a:endParaRPr lang="es-ES" dirty="0"/>
           </a:p>
@@ -4058,7 +4058,7 @@
           <a:p>
             <a:fld id="{64B06C07-F37A-4A03-A4E0-24643B0A2624}" type="slidenum">
               <a:rPr lang="es-ES" smtClean="0"/>
-              <a:t>‹Nº›</a:t>
+              <a:t>‹Nr.›</a:t>
             </a:fld>
             <a:endParaRPr lang="es-ES" dirty="0"/>
           </a:p>
@@ -4458,7 +4458,7 @@
           <a:p>
             <a:fld id="{E8895E6F-FE7D-47F3-BF3F-C434BE78B7A5}" type="datetimeFigureOut">
               <a:rPr lang="es-ES" smtClean="0"/>
-              <a:t>29/10/aa</a:t>
+              <a:t>30/10/15</a:t>
             </a:fld>
             <a:endParaRPr lang="es-ES" dirty="0"/>
           </a:p>
@@ -4500,7 +4500,7 @@
           <a:p>
             <a:fld id="{64B06C07-F37A-4A03-A4E0-24643B0A2624}" type="slidenum">
               <a:rPr lang="es-ES" smtClean="0"/>
-              <a:t>‹Nº›</a:t>
+              <a:t>‹Nr.›</a:t>
             </a:fld>
             <a:endParaRPr lang="es-ES" dirty="0"/>
           </a:p>
@@ -4576,7 +4576,7 @@
           <a:p>
             <a:fld id="{E8895E6F-FE7D-47F3-BF3F-C434BE78B7A5}" type="datetimeFigureOut">
               <a:rPr lang="es-ES" smtClean="0"/>
-              <a:t>29/10/aa</a:t>
+              <a:t>30/10/15</a:t>
             </a:fld>
             <a:endParaRPr lang="es-ES" dirty="0"/>
           </a:p>
@@ -4618,7 +4618,7 @@
           <a:p>
             <a:fld id="{64B06C07-F37A-4A03-A4E0-24643B0A2624}" type="slidenum">
               <a:rPr lang="es-ES" smtClean="0"/>
-              <a:t>‹Nº›</a:t>
+              <a:t>‹Nr.›</a:t>
             </a:fld>
             <a:endParaRPr lang="es-ES" dirty="0"/>
           </a:p>
@@ -4671,7 +4671,7 @@
           <a:p>
             <a:fld id="{E8895E6F-FE7D-47F3-BF3F-C434BE78B7A5}" type="datetimeFigureOut">
               <a:rPr lang="es-ES" smtClean="0"/>
-              <a:t>29/10/aa</a:t>
+              <a:t>30/10/15</a:t>
             </a:fld>
             <a:endParaRPr lang="es-ES" dirty="0"/>
           </a:p>
@@ -4713,7 +4713,7 @@
           <a:p>
             <a:fld id="{64B06C07-F37A-4A03-A4E0-24643B0A2624}" type="slidenum">
               <a:rPr lang="es-ES" smtClean="0"/>
-              <a:t>‹Nº›</a:t>
+              <a:t>‹Nr.›</a:t>
             </a:fld>
             <a:endParaRPr lang="es-ES" dirty="0"/>
           </a:p>
@@ -4954,7 +4954,7 @@
           <a:p>
             <a:fld id="{E8895E6F-FE7D-47F3-BF3F-C434BE78B7A5}" type="datetimeFigureOut">
               <a:rPr lang="es-ES" smtClean="0"/>
-              <a:t>29/10/aa</a:t>
+              <a:t>30/10/15</a:t>
             </a:fld>
             <a:endParaRPr lang="es-ES" dirty="0"/>
           </a:p>
@@ -4996,7 +4996,7 @@
           <a:p>
             <a:fld id="{64B06C07-F37A-4A03-A4E0-24643B0A2624}" type="slidenum">
               <a:rPr lang="es-ES" smtClean="0"/>
-              <a:t>‹Nº›</a:t>
+              <a:t>‹Nr.›</a:t>
             </a:fld>
             <a:endParaRPr lang="es-ES" dirty="0"/>
           </a:p>
@@ -5245,7 +5245,7 @@
           <a:p>
             <a:fld id="{E8895E6F-FE7D-47F3-BF3F-C434BE78B7A5}" type="datetimeFigureOut">
               <a:rPr lang="es-ES" smtClean="0"/>
-              <a:t>29/10/aa</a:t>
+              <a:t>30/10/15</a:t>
             </a:fld>
             <a:endParaRPr lang="es-ES" dirty="0"/>
           </a:p>
@@ -5287,7 +5287,7 @@
           <a:p>
             <a:fld id="{64B06C07-F37A-4A03-A4E0-24643B0A2624}" type="slidenum">
               <a:rPr lang="es-ES" smtClean="0"/>
-              <a:t>‹Nº›</a:t>
+              <a:t>‹Nr.›</a:t>
             </a:fld>
             <a:endParaRPr lang="es-ES" dirty="0"/>
           </a:p>
@@ -5769,7 +5769,7 @@
           <a:p>
             <a:fld id="{E8895E6F-FE7D-47F3-BF3F-C434BE78B7A5}" type="datetimeFigureOut">
               <a:rPr lang="es-ES" smtClean="0"/>
-              <a:t>29/10/aa</a:t>
+              <a:t>30/10/15</a:t>
             </a:fld>
             <a:endParaRPr lang="es-ES" dirty="0"/>
           </a:p>
@@ -5847,7 +5847,7 @@
           <a:p>
             <a:fld id="{64B06C07-F37A-4A03-A4E0-24643B0A2624}" type="slidenum">
               <a:rPr lang="es-ES" smtClean="0"/>
-              <a:t>‹Nº›</a:t>
+              <a:t>‹Nr.›</a:t>
             </a:fld>
             <a:endParaRPr lang="es-ES" dirty="0"/>
           </a:p>
@@ -7679,18 +7679,64 @@
             <a:endParaRPr lang="es-ES" sz="1200" dirty="0" smtClean="0"/>
           </a:p>
           <a:p>
-            <a:endParaRPr lang="es-ES" sz="1200" dirty="0"/>
-          </a:p>
-          <a:p>
-            <a:endParaRPr lang="es-ES" sz="1100" dirty="0"/>
-          </a:p>
-          <a:p>
-            <a:endParaRPr lang="es-ES" sz="1400" dirty="0"/>
-          </a:p>
-          <a:p>
-            <a:endParaRPr lang="es-ES" sz="1400" dirty="0"/>
-          </a:p>
-          <a:p>
+            <a:r>
+              <a:rPr lang="es-ES" sz="1400" dirty="0"/>
+              <a:t>[7github] </a:t>
+            </a:r>
+            <a:r>
+              <a:rPr lang="es-ES" sz="1400" dirty="0">
+                <a:hlinkClick r:id="rId8"/>
+              </a:rPr>
+              <a:t>https://</a:t>
+            </a:r>
+            <a:r>
+              <a:rPr lang="es-ES" sz="1400" dirty="0" smtClean="0">
+                <a:hlinkClick r:id="rId8"/>
+              </a:rPr>
+              <a:t>github.com/PacoPollos</a:t>
+            </a:r>
+            <a:endParaRPr lang="es-ES" sz="1400" dirty="0" smtClean="0"/>
+          </a:p>
+          <a:p>
+            <a:r>
+              <a:rPr lang="es-ES" sz="1400" dirty="0"/>
+              <a:t>[8github] </a:t>
+            </a:r>
+            <a:r>
+              <a:rPr lang="es-ES" sz="1400" dirty="0">
+                <a:hlinkClick r:id="rId9"/>
+              </a:rPr>
+              <a:t>https://</a:t>
+            </a:r>
+            <a:r>
+              <a:rPr lang="es-ES" sz="1400" dirty="0" smtClean="0">
+                <a:hlinkClick r:id="rId9"/>
+              </a:rPr>
+              <a:t>github.com/Exea</a:t>
+            </a:r>
+            <a:endParaRPr lang="es-ES" sz="1400" dirty="0" smtClean="0"/>
+          </a:p>
+          <a:p>
+            <a:r>
+              <a:rPr lang="es-ES" sz="1400" dirty="0"/>
+              <a:t>[9stackoverflow] </a:t>
+            </a:r>
+            <a:r>
+              <a:rPr lang="es-ES" sz="1400" dirty="0">
+                <a:hlinkClick r:id="rId10"/>
+              </a:rPr>
+              <a:t>http://</a:t>
+            </a:r>
+            <a:r>
+              <a:rPr lang="es-ES" sz="1400" dirty="0" smtClean="0">
+                <a:hlinkClick r:id="rId10"/>
+              </a:rPr>
+              <a:t>stackoverflow.com</a:t>
+            </a:r>
+            <a:r>
+              <a:rPr lang="es-ES" sz="1400" dirty="0" smtClean="0"/>
+              <a:t> </a:t>
+            </a:r>
             <a:endParaRPr lang="es-ES" sz="1400" dirty="0"/>
           </a:p>
         </p:txBody>
@@ -7913,35 +7959,7 @@
           <a:p>
             <a:r>
               <a:rPr lang="es-ES" dirty="0" smtClean="0"/>
-              <a:t>En Visual </a:t>
-            </a:r>
-            <a:r>
-              <a:rPr lang="es-ES" dirty="0" smtClean="0"/>
-              <a:t>Studio -&gt; </a:t>
-            </a:r>
-            <a:r>
-              <a:rPr lang="es-ES" dirty="0" smtClean="0"/>
-              <a:t>Nuevo </a:t>
-            </a:r>
-            <a:r>
-              <a:rPr lang="es-ES" dirty="0" smtClean="0"/>
-              <a:t>Proyecto -&gt; Visual </a:t>
-            </a:r>
-            <a:r>
-              <a:rPr lang="es-ES" dirty="0" smtClean="0"/>
-              <a:t>C</a:t>
-            </a:r>
-            <a:r>
-              <a:rPr lang="es-ES" dirty="0" smtClean="0"/>
-              <a:t># -&gt; </a:t>
-            </a:r>
-            <a:r>
-              <a:rPr lang="es-ES" dirty="0" smtClean="0"/>
-              <a:t>Aplicación WPF </a:t>
-            </a:r>
-            <a:r>
-              <a:rPr lang="es-ES" dirty="0" smtClean="0"/>
-              <a:t>-&gt; Dar nombre</a:t>
+              <a:t>En Visual Studio -&gt; Nuevo Proyecto -&gt; Visual C# -&gt; Aplicación WPF -&gt; Dar nombre</a:t>
             </a:r>
             <a:endParaRPr lang="es-ES" dirty="0"/>
           </a:p>

</xml_diff>